<commit_message>
Requerimentos actualizados en Power Point
</commit_message>
<xml_diff>
--- a/requerimentos/Planificación.pptx
+++ b/requerimentos/Planificación.pptx
@@ -175,7 +175,7 @@
           <a:noFill/>
           <a:extLst>
             <a:ext uri="{909E8E84-426E-40dd-AFC4-6F175D3DCCD1}">
-              <a14:hiddenFill xmlns:a14="http://schemas.microsoft.com/office/drawing/2010/main" xmlns="">
+              <a14:hiddenFill xmlns="" xmlns:a14="http://schemas.microsoft.com/office/drawing/2010/main">
                 <a:solidFill>
                   <a:srgbClr val="FFFFFF"/>
                 </a:solidFill>
@@ -234,7 +234,7 @@
             </a:ln>
             <a:extLst>
               <a:ext uri="{91240B29-F687-4f45-9708-019B960494DF}">
-                <a14:hiddenLine xmlns:a14="http://schemas.microsoft.com/office/drawing/2010/main" xmlns="" w="9525">
+                <a14:hiddenLine xmlns="" xmlns:a14="http://schemas.microsoft.com/office/drawing/2010/main" w="9525">
                   <a:solidFill>
                     <a:srgbClr val="000000"/>
                   </a:solidFill>
@@ -324,7 +324,7 @@
             </a:ln>
             <a:extLst>
               <a:ext uri="{91240B29-F687-4f45-9708-019B960494DF}">
-                <a14:hiddenLine xmlns:a14="http://schemas.microsoft.com/office/drawing/2010/main" xmlns="" w="9525">
+                <a14:hiddenLine xmlns="" xmlns:a14="http://schemas.microsoft.com/office/drawing/2010/main" w="9525">
                   <a:solidFill>
                     <a:srgbClr val="000000"/>
                   </a:solidFill>
@@ -414,7 +414,7 @@
             </a:ln>
             <a:extLst>
               <a:ext uri="{91240B29-F687-4f45-9708-019B960494DF}">
-                <a14:hiddenLine xmlns:a14="http://schemas.microsoft.com/office/drawing/2010/main" xmlns="" w="9525">
+                <a14:hiddenLine xmlns="" xmlns:a14="http://schemas.microsoft.com/office/drawing/2010/main" w="9525">
                   <a:solidFill>
                     <a:srgbClr val="000000"/>
                   </a:solidFill>
@@ -448,7 +448,7 @@
             </a:ln>
             <a:extLst>
               <a:ext uri="{91240B29-F687-4f45-9708-019B960494DF}">
-                <a14:hiddenLine xmlns:a14="http://schemas.microsoft.com/office/drawing/2010/main" xmlns="" w="9525">
+                <a14:hiddenLine xmlns="" xmlns:a14="http://schemas.microsoft.com/office/drawing/2010/main" w="9525">
                   <a:solidFill>
                     <a:srgbClr val="000000"/>
                   </a:solidFill>
@@ -538,7 +538,7 @@
             </a:ln>
             <a:extLst>
               <a:ext uri="{91240B29-F687-4f45-9708-019B960494DF}">
-                <a14:hiddenLine xmlns:a14="http://schemas.microsoft.com/office/drawing/2010/main" xmlns="" w="9525">
+                <a14:hiddenLine xmlns="" xmlns:a14="http://schemas.microsoft.com/office/drawing/2010/main" w="9525">
                   <a:solidFill>
                     <a:srgbClr val="000000"/>
                   </a:solidFill>
@@ -600,7 +600,7 @@
             </a:ln>
             <a:extLst>
               <a:ext uri="{91240B29-F687-4f45-9708-019B960494DF}">
-                <a14:hiddenLine xmlns:a14="http://schemas.microsoft.com/office/drawing/2010/main" xmlns="" w="9525">
+                <a14:hiddenLine xmlns="" xmlns:a14="http://schemas.microsoft.com/office/drawing/2010/main" w="9525">
                   <a:solidFill>
                     <a:srgbClr val="000000"/>
                   </a:solidFill>
@@ -662,7 +662,7 @@
             </a:ln>
             <a:extLst>
               <a:ext uri="{91240B29-F687-4f45-9708-019B960494DF}">
-                <a14:hiddenLine xmlns:a14="http://schemas.microsoft.com/office/drawing/2010/main" xmlns="" w="9525">
+                <a14:hiddenLine xmlns="" xmlns:a14="http://schemas.microsoft.com/office/drawing/2010/main" w="9525">
                   <a:solidFill>
                     <a:srgbClr val="000000"/>
                   </a:solidFill>
@@ -752,7 +752,7 @@
             </a:ln>
             <a:extLst>
               <a:ext uri="{91240B29-F687-4f45-9708-019B960494DF}">
-                <a14:hiddenLine xmlns:a14="http://schemas.microsoft.com/office/drawing/2010/main" xmlns="" w="9525">
+                <a14:hiddenLine xmlns="" xmlns:a14="http://schemas.microsoft.com/office/drawing/2010/main" w="9525">
                   <a:solidFill>
                     <a:srgbClr val="000000"/>
                   </a:solidFill>
@@ -814,7 +814,7 @@
             </a:ln>
             <a:extLst>
               <a:ext uri="{91240B29-F687-4f45-9708-019B960494DF}">
-                <a14:hiddenLine xmlns:a14="http://schemas.microsoft.com/office/drawing/2010/main" xmlns="" w="9525">
+                <a14:hiddenLine xmlns="" xmlns:a14="http://schemas.microsoft.com/office/drawing/2010/main" w="9525">
                   <a:solidFill>
                     <a:srgbClr val="000000"/>
                   </a:solidFill>
@@ -876,7 +876,7 @@
             </a:ln>
             <a:extLst>
               <a:ext uri="{91240B29-F687-4f45-9708-019B960494DF}">
-                <a14:hiddenLine xmlns:a14="http://schemas.microsoft.com/office/drawing/2010/main" xmlns="" w="9525">
+                <a14:hiddenLine xmlns="" xmlns:a14="http://schemas.microsoft.com/office/drawing/2010/main" w="9525">
                   <a:solidFill>
                     <a:srgbClr val="000000"/>
                   </a:solidFill>
@@ -966,7 +966,7 @@
             </a:ln>
             <a:extLst>
               <a:ext uri="{91240B29-F687-4f45-9708-019B960494DF}">
-                <a14:hiddenLine xmlns:a14="http://schemas.microsoft.com/office/drawing/2010/main" xmlns="" w="9525">
+                <a14:hiddenLine xmlns="" xmlns:a14="http://schemas.microsoft.com/office/drawing/2010/main" w="9525">
                   <a:solidFill>
                     <a:srgbClr val="000000"/>
                   </a:solidFill>
@@ -1056,7 +1056,7 @@
             </a:ln>
             <a:extLst>
               <a:ext uri="{91240B29-F687-4f45-9708-019B960494DF}">
-                <a14:hiddenLine xmlns:a14="http://schemas.microsoft.com/office/drawing/2010/main" xmlns="" w="9525">
+                <a14:hiddenLine xmlns="" xmlns:a14="http://schemas.microsoft.com/office/drawing/2010/main" w="9525">
                   <a:solidFill>
                     <a:srgbClr val="000000"/>
                   </a:solidFill>
@@ -1118,7 +1118,7 @@
             </a:ln>
             <a:extLst>
               <a:ext uri="{91240B29-F687-4f45-9708-019B960494DF}">
-                <a14:hiddenLine xmlns:a14="http://schemas.microsoft.com/office/drawing/2010/main" xmlns="" w="9525">
+                <a14:hiddenLine xmlns="" xmlns:a14="http://schemas.microsoft.com/office/drawing/2010/main" w="9525">
                   <a:solidFill>
                     <a:srgbClr val="000000"/>
                   </a:solidFill>
@@ -1228,7 +1228,7 @@
             </a:ln>
             <a:extLst>
               <a:ext uri="{91240B29-F687-4f45-9708-019B960494DF}">
-                <a14:hiddenLine xmlns:a14="http://schemas.microsoft.com/office/drawing/2010/main" xmlns="" w="9525">
+                <a14:hiddenLine xmlns="" xmlns:a14="http://schemas.microsoft.com/office/drawing/2010/main" w="9525">
                   <a:solidFill>
                     <a:srgbClr val="000000"/>
                   </a:solidFill>
@@ -1290,7 +1290,7 @@
             </a:ln>
             <a:extLst>
               <a:ext uri="{91240B29-F687-4f45-9708-019B960494DF}">
-                <a14:hiddenLine xmlns:a14="http://schemas.microsoft.com/office/drawing/2010/main" xmlns="" w="9525">
+                <a14:hiddenLine xmlns="" xmlns:a14="http://schemas.microsoft.com/office/drawing/2010/main" w="9525">
                   <a:solidFill>
                     <a:srgbClr val="000000"/>
                   </a:solidFill>
@@ -1380,7 +1380,7 @@
             </a:ln>
             <a:extLst>
               <a:ext uri="{91240B29-F687-4f45-9708-019B960494DF}">
-                <a14:hiddenLine xmlns:a14="http://schemas.microsoft.com/office/drawing/2010/main" xmlns="" w="9525">
+                <a14:hiddenLine xmlns="" xmlns:a14="http://schemas.microsoft.com/office/drawing/2010/main" w="9525">
                   <a:solidFill>
                     <a:srgbClr val="000000"/>
                   </a:solidFill>
@@ -1470,7 +1470,7 @@
             </a:ln>
             <a:extLst>
               <a:ext uri="{91240B29-F687-4f45-9708-019B960494DF}">
-                <a14:hiddenLine xmlns:a14="http://schemas.microsoft.com/office/drawing/2010/main" xmlns="" w="9525">
+                <a14:hiddenLine xmlns="" xmlns:a14="http://schemas.microsoft.com/office/drawing/2010/main" w="9525">
                   <a:solidFill>
                     <a:srgbClr val="000000"/>
                   </a:solidFill>
@@ -1532,7 +1532,7 @@
             </a:ln>
             <a:extLst>
               <a:ext uri="{91240B29-F687-4f45-9708-019B960494DF}">
-                <a14:hiddenLine xmlns:a14="http://schemas.microsoft.com/office/drawing/2010/main" xmlns="" w="9525">
+                <a14:hiddenLine xmlns="" xmlns:a14="http://schemas.microsoft.com/office/drawing/2010/main" w="9525">
                   <a:solidFill>
                     <a:srgbClr val="000000"/>
                   </a:solidFill>
@@ -1622,7 +1622,7 @@
             </a:ln>
             <a:extLst>
               <a:ext uri="{91240B29-F687-4f45-9708-019B960494DF}">
-                <a14:hiddenLine xmlns:a14="http://schemas.microsoft.com/office/drawing/2010/main" xmlns="" w="9525">
+                <a14:hiddenLine xmlns="" xmlns:a14="http://schemas.microsoft.com/office/drawing/2010/main" w="9525">
                   <a:solidFill>
                     <a:srgbClr val="000000"/>
                   </a:solidFill>
@@ -1712,7 +1712,7 @@
             </a:ln>
             <a:extLst>
               <a:ext uri="{91240B29-F687-4f45-9708-019B960494DF}">
-                <a14:hiddenLine xmlns:a14="http://schemas.microsoft.com/office/drawing/2010/main" xmlns="" w="9525">
+                <a14:hiddenLine xmlns="" xmlns:a14="http://schemas.microsoft.com/office/drawing/2010/main" w="9525">
                   <a:solidFill>
                     <a:srgbClr val="000000"/>
                   </a:solidFill>
@@ -1768,7 +1768,7 @@
             </a:ln>
             <a:extLst>
               <a:ext uri="{91240B29-F687-4f45-9708-019B960494DF}">
-                <a14:hiddenLine xmlns:a14="http://schemas.microsoft.com/office/drawing/2010/main" xmlns="" w="9525">
+                <a14:hiddenLine xmlns="" xmlns:a14="http://schemas.microsoft.com/office/drawing/2010/main" w="9525">
                   <a:solidFill>
                     <a:srgbClr val="000000"/>
                   </a:solidFill>
@@ -1858,7 +1858,7 @@
             </a:ln>
             <a:extLst>
               <a:ext uri="{91240B29-F687-4f45-9708-019B960494DF}">
-                <a14:hiddenLine xmlns:a14="http://schemas.microsoft.com/office/drawing/2010/main" xmlns="" w="9525">
+                <a14:hiddenLine xmlns="" xmlns:a14="http://schemas.microsoft.com/office/drawing/2010/main" w="9525">
                   <a:solidFill>
                     <a:srgbClr val="000000"/>
                   </a:solidFill>
@@ -1914,7 +1914,7 @@
             </a:ln>
             <a:extLst>
               <a:ext uri="{91240B29-F687-4f45-9708-019B960494DF}">
-                <a14:hiddenLine xmlns:a14="http://schemas.microsoft.com/office/drawing/2010/main" xmlns="" w="9525">
+                <a14:hiddenLine xmlns="" xmlns:a14="http://schemas.microsoft.com/office/drawing/2010/main" w="9525">
                   <a:solidFill>
                     <a:srgbClr val="000000"/>
                   </a:solidFill>
@@ -2004,7 +2004,7 @@
             </a:ln>
             <a:extLst>
               <a:ext uri="{91240B29-F687-4f45-9708-019B960494DF}">
-                <a14:hiddenLine xmlns:a14="http://schemas.microsoft.com/office/drawing/2010/main" xmlns="" w="9525">
+                <a14:hiddenLine xmlns="" xmlns:a14="http://schemas.microsoft.com/office/drawing/2010/main" w="9525">
                   <a:solidFill>
                     <a:srgbClr val="000000"/>
                   </a:solidFill>
@@ -2072,7 +2072,7 @@
             </a:ln>
             <a:extLst>
               <a:ext uri="{91240B29-F687-4f45-9708-019B960494DF}">
-                <a14:hiddenLine xmlns:a14="http://schemas.microsoft.com/office/drawing/2010/main" xmlns="" w="9525">
+                <a14:hiddenLine xmlns="" xmlns:a14="http://schemas.microsoft.com/office/drawing/2010/main" w="9525">
                   <a:solidFill>
                     <a:srgbClr val="000000"/>
                   </a:solidFill>
@@ -2162,7 +2162,7 @@
             </a:ln>
             <a:extLst>
               <a:ext uri="{91240B29-F687-4f45-9708-019B960494DF}">
-                <a14:hiddenLine xmlns:a14="http://schemas.microsoft.com/office/drawing/2010/main" xmlns="" w="9525">
+                <a14:hiddenLine xmlns="" xmlns:a14="http://schemas.microsoft.com/office/drawing/2010/main" w="9525">
                   <a:solidFill>
                     <a:srgbClr val="000000"/>
                   </a:solidFill>
@@ -2230,7 +2230,7 @@
             </a:ln>
             <a:extLst>
               <a:ext uri="{91240B29-F687-4f45-9708-019B960494DF}">
-                <a14:hiddenLine xmlns:a14="http://schemas.microsoft.com/office/drawing/2010/main" xmlns="" w="9525">
+                <a14:hiddenLine xmlns="" xmlns:a14="http://schemas.microsoft.com/office/drawing/2010/main" w="9525">
                   <a:solidFill>
                     <a:srgbClr val="000000"/>
                   </a:solidFill>
@@ -2320,7 +2320,7 @@
             </a:ln>
             <a:extLst>
               <a:ext uri="{91240B29-F687-4f45-9708-019B960494DF}">
-                <a14:hiddenLine xmlns:a14="http://schemas.microsoft.com/office/drawing/2010/main" xmlns="" w="9525">
+                <a14:hiddenLine xmlns="" xmlns:a14="http://schemas.microsoft.com/office/drawing/2010/main" w="9525">
                   <a:solidFill>
                     <a:srgbClr val="000000"/>
                   </a:solidFill>
@@ -2354,7 +2354,7 @@
             </a:ln>
             <a:extLst>
               <a:ext uri="{91240B29-F687-4f45-9708-019B960494DF}">
-                <a14:hiddenLine xmlns:a14="http://schemas.microsoft.com/office/drawing/2010/main" xmlns="" w="9525">
+                <a14:hiddenLine xmlns="" xmlns:a14="http://schemas.microsoft.com/office/drawing/2010/main" w="9525">
                   <a:solidFill>
                     <a:srgbClr val="000000"/>
                   </a:solidFill>
@@ -2444,7 +2444,7 @@
             </a:ln>
             <a:extLst>
               <a:ext uri="{91240B29-F687-4f45-9708-019B960494DF}">
-                <a14:hiddenLine xmlns:a14="http://schemas.microsoft.com/office/drawing/2010/main" xmlns="" w="9525">
+                <a14:hiddenLine xmlns="" xmlns:a14="http://schemas.microsoft.com/office/drawing/2010/main" w="9525">
                   <a:solidFill>
                     <a:srgbClr val="000000"/>
                   </a:solidFill>
@@ -2506,7 +2506,7 @@
             </a:ln>
             <a:extLst>
               <a:ext uri="{91240B29-F687-4f45-9708-019B960494DF}">
-                <a14:hiddenLine xmlns:a14="http://schemas.microsoft.com/office/drawing/2010/main" xmlns="" w="9525">
+                <a14:hiddenLine xmlns="" xmlns:a14="http://schemas.microsoft.com/office/drawing/2010/main" w="9525">
                   <a:solidFill>
                     <a:srgbClr val="000000"/>
                   </a:solidFill>
@@ -2568,7 +2568,7 @@
             </a:ln>
             <a:extLst>
               <a:ext uri="{91240B29-F687-4f45-9708-019B960494DF}">
-                <a14:hiddenLine xmlns:a14="http://schemas.microsoft.com/office/drawing/2010/main" xmlns="" w="9525">
+                <a14:hiddenLine xmlns="" xmlns:a14="http://schemas.microsoft.com/office/drawing/2010/main" w="9525">
                   <a:solidFill>
                     <a:srgbClr val="000000"/>
                   </a:solidFill>
@@ -2658,7 +2658,7 @@
             </a:ln>
             <a:extLst>
               <a:ext uri="{91240B29-F687-4f45-9708-019B960494DF}">
-                <a14:hiddenLine xmlns:a14="http://schemas.microsoft.com/office/drawing/2010/main" xmlns="" w="9525">
+                <a14:hiddenLine xmlns="" xmlns:a14="http://schemas.microsoft.com/office/drawing/2010/main" w="9525">
                   <a:solidFill>
                     <a:srgbClr val="000000"/>
                   </a:solidFill>
@@ -2726,7 +2726,7 @@
             </a:ln>
             <a:extLst>
               <a:ext uri="{91240B29-F687-4f45-9708-019B960494DF}">
-                <a14:hiddenLine xmlns:a14="http://schemas.microsoft.com/office/drawing/2010/main" xmlns="" w="9525">
+                <a14:hiddenLine xmlns="" xmlns:a14="http://schemas.microsoft.com/office/drawing/2010/main" w="9525">
                   <a:solidFill>
                     <a:srgbClr val="000000"/>
                   </a:solidFill>
@@ -2788,7 +2788,7 @@
             </a:ln>
             <a:extLst>
               <a:ext uri="{91240B29-F687-4f45-9708-019B960494DF}">
-                <a14:hiddenLine xmlns:a14="http://schemas.microsoft.com/office/drawing/2010/main" xmlns="" w="9525">
+                <a14:hiddenLine xmlns="" xmlns:a14="http://schemas.microsoft.com/office/drawing/2010/main" w="9525">
                   <a:solidFill>
                     <a:srgbClr val="000000"/>
                   </a:solidFill>
@@ -2878,7 +2878,7 @@
             </a:ln>
             <a:extLst>
               <a:ext uri="{91240B29-F687-4f45-9708-019B960494DF}">
-                <a14:hiddenLine xmlns:a14="http://schemas.microsoft.com/office/drawing/2010/main" xmlns="" w="9525">
+                <a14:hiddenLine xmlns="" xmlns:a14="http://schemas.microsoft.com/office/drawing/2010/main" w="9525">
                   <a:solidFill>
                     <a:srgbClr val="000000"/>
                   </a:solidFill>
@@ -2940,7 +2940,7 @@
             </a:ln>
             <a:extLst>
               <a:ext uri="{91240B29-F687-4f45-9708-019B960494DF}">
-                <a14:hiddenLine xmlns:a14="http://schemas.microsoft.com/office/drawing/2010/main" xmlns="" w="9525">
+                <a14:hiddenLine xmlns="" xmlns:a14="http://schemas.microsoft.com/office/drawing/2010/main" w="9525">
                   <a:solidFill>
                     <a:srgbClr val="000000"/>
                   </a:solidFill>
@@ -3030,7 +3030,7 @@
             </a:ln>
             <a:extLst>
               <a:ext uri="{91240B29-F687-4f45-9708-019B960494DF}">
-                <a14:hiddenLine xmlns:a14="http://schemas.microsoft.com/office/drawing/2010/main" xmlns="" w="9525">
+                <a14:hiddenLine xmlns="" xmlns:a14="http://schemas.microsoft.com/office/drawing/2010/main" w="9525">
                   <a:solidFill>
                     <a:srgbClr val="000000"/>
                   </a:solidFill>
@@ -3092,7 +3092,7 @@
             </a:ln>
             <a:extLst>
               <a:ext uri="{91240B29-F687-4f45-9708-019B960494DF}">
-                <a14:hiddenLine xmlns:a14="http://schemas.microsoft.com/office/drawing/2010/main" xmlns="" w="9525">
+                <a14:hiddenLine xmlns="" xmlns:a14="http://schemas.microsoft.com/office/drawing/2010/main" w="9525">
                   <a:solidFill>
                     <a:srgbClr val="000000"/>
                   </a:solidFill>
@@ -3182,7 +3182,7 @@
             </a:ln>
             <a:extLst>
               <a:ext uri="{91240B29-F687-4f45-9708-019B960494DF}">
-                <a14:hiddenLine xmlns:a14="http://schemas.microsoft.com/office/drawing/2010/main" xmlns="" w="9525">
+                <a14:hiddenLine xmlns="" xmlns:a14="http://schemas.microsoft.com/office/drawing/2010/main" w="9525">
                   <a:solidFill>
                     <a:srgbClr val="000000"/>
                   </a:solidFill>
@@ -3216,7 +3216,7 @@
             </a:ln>
             <a:extLst>
               <a:ext uri="{91240B29-F687-4f45-9708-019B960494DF}">
-                <a14:hiddenLine xmlns:a14="http://schemas.microsoft.com/office/drawing/2010/main" xmlns="" w="9525">
+                <a14:hiddenLine xmlns="" xmlns:a14="http://schemas.microsoft.com/office/drawing/2010/main" w="9525">
                   <a:solidFill>
                     <a:srgbClr val="000000"/>
                   </a:solidFill>
@@ -3281,7 +3281,7 @@
             </a:ln>
             <a:extLst>
               <a:ext uri="{91240B29-F687-4f45-9708-019B960494DF}">
-                <a14:hiddenLine xmlns:a14="http://schemas.microsoft.com/office/drawing/2010/main" xmlns="" w="9525">
+                <a14:hiddenLine xmlns="" xmlns:a14="http://schemas.microsoft.com/office/drawing/2010/main" w="9525">
                   <a:solidFill>
                     <a:srgbClr val="000000"/>
                   </a:solidFill>
@@ -3371,7 +3371,7 @@
             </a:ln>
             <a:extLst>
               <a:ext uri="{91240B29-F687-4f45-9708-019B960494DF}">
-                <a14:hiddenLine xmlns:a14="http://schemas.microsoft.com/office/drawing/2010/main" xmlns="" w="9525">
+                <a14:hiddenLine xmlns="" xmlns:a14="http://schemas.microsoft.com/office/drawing/2010/main" w="9525">
                   <a:solidFill>
                     <a:srgbClr val="000000"/>
                   </a:solidFill>
@@ -3433,7 +3433,7 @@
             </a:ln>
             <a:extLst>
               <a:ext uri="{91240B29-F687-4f45-9708-019B960494DF}">
-                <a14:hiddenLine xmlns:a14="http://schemas.microsoft.com/office/drawing/2010/main" xmlns="" w="9525">
+                <a14:hiddenLine xmlns="" xmlns:a14="http://schemas.microsoft.com/office/drawing/2010/main" w="9525">
                   <a:solidFill>
                     <a:srgbClr val="000000"/>
                   </a:solidFill>
@@ -3523,7 +3523,7 @@
             </a:ln>
             <a:extLst>
               <a:ext uri="{91240B29-F687-4f45-9708-019B960494DF}">
-                <a14:hiddenLine xmlns:a14="http://schemas.microsoft.com/office/drawing/2010/main" xmlns="" w="9525">
+                <a14:hiddenLine xmlns="" xmlns:a14="http://schemas.microsoft.com/office/drawing/2010/main" w="9525">
                   <a:solidFill>
                     <a:srgbClr val="000000"/>
                   </a:solidFill>
@@ -3613,7 +3613,7 @@
             </a:ln>
             <a:extLst>
               <a:ext uri="{91240B29-F687-4f45-9708-019B960494DF}">
-                <a14:hiddenLine xmlns:a14="http://schemas.microsoft.com/office/drawing/2010/main" xmlns="" w="9525">
+                <a14:hiddenLine xmlns="" xmlns:a14="http://schemas.microsoft.com/office/drawing/2010/main" w="9525">
                   <a:solidFill>
                     <a:srgbClr val="000000"/>
                   </a:solidFill>
@@ -3678,7 +3678,7 @@
             </a:ln>
             <a:extLst>
               <a:ext uri="{91240B29-F687-4f45-9708-019B960494DF}">
-                <a14:hiddenLine xmlns:a14="http://schemas.microsoft.com/office/drawing/2010/main" xmlns="" w="9525">
+                <a14:hiddenLine xmlns="" xmlns:a14="http://schemas.microsoft.com/office/drawing/2010/main" w="9525">
                   <a:solidFill>
                     <a:srgbClr val="000000"/>
                   </a:solidFill>
@@ -3740,7 +3740,7 @@
             </a:ln>
             <a:extLst>
               <a:ext uri="{91240B29-F687-4f45-9708-019B960494DF}">
-                <a14:hiddenLine xmlns:a14="http://schemas.microsoft.com/office/drawing/2010/main" xmlns="" w="9525">
+                <a14:hiddenLine xmlns="" xmlns:a14="http://schemas.microsoft.com/office/drawing/2010/main" w="9525">
                   <a:solidFill>
                     <a:srgbClr val="000000"/>
                   </a:solidFill>
@@ -3830,7 +3830,7 @@
             </a:ln>
             <a:extLst>
               <a:ext uri="{91240B29-F687-4f45-9708-019B960494DF}">
-                <a14:hiddenLine xmlns:a14="http://schemas.microsoft.com/office/drawing/2010/main" xmlns="" w="9525">
+                <a14:hiddenLine xmlns="" xmlns:a14="http://schemas.microsoft.com/office/drawing/2010/main" w="9525">
                   <a:solidFill>
                     <a:srgbClr val="000000"/>
                   </a:solidFill>
@@ -3920,7 +3920,7 @@
             </a:ln>
             <a:extLst>
               <a:ext uri="{91240B29-F687-4f45-9708-019B960494DF}">
-                <a14:hiddenLine xmlns:a14="http://schemas.microsoft.com/office/drawing/2010/main" xmlns="" w="9525">
+                <a14:hiddenLine xmlns="" xmlns:a14="http://schemas.microsoft.com/office/drawing/2010/main" w="9525">
                   <a:solidFill>
                     <a:srgbClr val="000000"/>
                   </a:solidFill>
@@ -3982,7 +3982,7 @@
             </a:ln>
             <a:extLst>
               <a:ext uri="{91240B29-F687-4f45-9708-019B960494DF}">
-                <a14:hiddenLine xmlns:a14="http://schemas.microsoft.com/office/drawing/2010/main" xmlns="" w="9525">
+                <a14:hiddenLine xmlns="" xmlns:a14="http://schemas.microsoft.com/office/drawing/2010/main" w="9525">
                   <a:solidFill>
                     <a:srgbClr val="000000"/>
                   </a:solidFill>
@@ -4102,7 +4102,7 @@
             </a:ln>
             <a:extLst>
               <a:ext uri="{91240B29-F687-4f45-9708-019B960494DF}">
-                <a14:hiddenLine xmlns:a14="http://schemas.microsoft.com/office/drawing/2010/main" xmlns="" w="9525">
+                <a14:hiddenLine xmlns="" xmlns:a14="http://schemas.microsoft.com/office/drawing/2010/main" w="9525">
                   <a:solidFill>
                     <a:srgbClr val="000000"/>
                   </a:solidFill>
@@ -4170,7 +4170,7 @@
             </a:ln>
             <a:extLst>
               <a:ext uri="{91240B29-F687-4f45-9708-019B960494DF}">
-                <a14:hiddenLine xmlns:a14="http://schemas.microsoft.com/office/drawing/2010/main" xmlns="" w="9525">
+                <a14:hiddenLine xmlns="" xmlns:a14="http://schemas.microsoft.com/office/drawing/2010/main" w="9525">
                   <a:solidFill>
                     <a:srgbClr val="000000"/>
                   </a:solidFill>
@@ -4260,7 +4260,7 @@
             </a:ln>
             <a:extLst>
               <a:ext uri="{91240B29-F687-4f45-9708-019B960494DF}">
-                <a14:hiddenLine xmlns:a14="http://schemas.microsoft.com/office/drawing/2010/main" xmlns="" w="9525">
+                <a14:hiddenLine xmlns="" xmlns:a14="http://schemas.microsoft.com/office/drawing/2010/main" w="9525">
                   <a:solidFill>
                     <a:srgbClr val="000000"/>
                   </a:solidFill>
@@ -9273,7 +9273,7 @@
           <a:noFill/>
           <a:extLst>
             <a:ext uri="{909E8E84-426E-40dd-AFC4-6F175D3DCCD1}">
-              <a14:hiddenFill xmlns:a14="http://schemas.microsoft.com/office/drawing/2010/main" xmlns="">
+              <a14:hiddenFill xmlns="" xmlns:a14="http://schemas.microsoft.com/office/drawing/2010/main">
                 <a:solidFill>
                   <a:srgbClr val="FFFFFF"/>
                 </a:solidFill>
@@ -9347,7 +9347,7 @@
               </a:ln>
               <a:extLst>
                 <a:ext uri="{91240B29-F687-4f45-9708-019B960494DF}">
-                  <a14:hiddenLine xmlns:a14="http://schemas.microsoft.com/office/drawing/2010/main" xmlns="" w="9525">
+                  <a14:hiddenLine xmlns="" xmlns:a14="http://schemas.microsoft.com/office/drawing/2010/main" w="9525">
                     <a:solidFill>
                       <a:srgbClr val="000000"/>
                     </a:solidFill>
@@ -9437,7 +9437,7 @@
               </a:ln>
               <a:extLst>
                 <a:ext uri="{91240B29-F687-4f45-9708-019B960494DF}">
-                  <a14:hiddenLine xmlns:a14="http://schemas.microsoft.com/office/drawing/2010/main" xmlns="" w="9525">
+                  <a14:hiddenLine xmlns="" xmlns:a14="http://schemas.microsoft.com/office/drawing/2010/main" w="9525">
                     <a:solidFill>
                       <a:srgbClr val="000000"/>
                     </a:solidFill>
@@ -9527,7 +9527,7 @@
               </a:ln>
               <a:extLst>
                 <a:ext uri="{91240B29-F687-4f45-9708-019B960494DF}">
-                  <a14:hiddenLine xmlns:a14="http://schemas.microsoft.com/office/drawing/2010/main" xmlns="" w="9525">
+                  <a14:hiddenLine xmlns="" xmlns:a14="http://schemas.microsoft.com/office/drawing/2010/main" w="9525">
                     <a:solidFill>
                       <a:srgbClr val="000000"/>
                     </a:solidFill>
@@ -9589,7 +9589,7 @@
               </a:ln>
               <a:extLst>
                 <a:ext uri="{91240B29-F687-4f45-9708-019B960494DF}">
-                  <a14:hiddenLine xmlns:a14="http://schemas.microsoft.com/office/drawing/2010/main" xmlns="" w="9525">
+                  <a14:hiddenLine xmlns="" xmlns:a14="http://schemas.microsoft.com/office/drawing/2010/main" w="9525">
                     <a:solidFill>
                       <a:srgbClr val="000000"/>
                     </a:solidFill>
@@ -9679,7 +9679,7 @@
               </a:ln>
               <a:extLst>
                 <a:ext uri="{91240B29-F687-4f45-9708-019B960494DF}">
-                  <a14:hiddenLine xmlns:a14="http://schemas.microsoft.com/office/drawing/2010/main" xmlns="" w="9525">
+                  <a14:hiddenLine xmlns="" xmlns:a14="http://schemas.microsoft.com/office/drawing/2010/main" w="9525">
                     <a:solidFill>
                       <a:srgbClr val="000000"/>
                     </a:solidFill>
@@ -9741,7 +9741,7 @@
               </a:ln>
               <a:extLst>
                 <a:ext uri="{91240B29-F687-4f45-9708-019B960494DF}">
-                  <a14:hiddenLine xmlns:a14="http://schemas.microsoft.com/office/drawing/2010/main" xmlns="" w="9525">
+                  <a14:hiddenLine xmlns="" xmlns:a14="http://schemas.microsoft.com/office/drawing/2010/main" w="9525">
                     <a:solidFill>
                       <a:srgbClr val="000000"/>
                     </a:solidFill>
@@ -9803,7 +9803,7 @@
               </a:ln>
               <a:extLst>
                 <a:ext uri="{91240B29-F687-4f45-9708-019B960494DF}">
-                  <a14:hiddenLine xmlns:a14="http://schemas.microsoft.com/office/drawing/2010/main" xmlns="" w="9525">
+                  <a14:hiddenLine xmlns="" xmlns:a14="http://schemas.microsoft.com/office/drawing/2010/main" w="9525">
                     <a:solidFill>
                       <a:srgbClr val="000000"/>
                     </a:solidFill>
@@ -9893,7 +9893,7 @@
               </a:ln>
               <a:extLst>
                 <a:ext uri="{91240B29-F687-4f45-9708-019B960494DF}">
-                  <a14:hiddenLine xmlns:a14="http://schemas.microsoft.com/office/drawing/2010/main" xmlns="" w="9525">
+                  <a14:hiddenLine xmlns="" xmlns:a14="http://schemas.microsoft.com/office/drawing/2010/main" w="9525">
                     <a:solidFill>
                       <a:srgbClr val="000000"/>
                     </a:solidFill>
@@ -9983,7 +9983,7 @@
               </a:ln>
               <a:extLst>
                 <a:ext uri="{91240B29-F687-4f45-9708-019B960494DF}">
-                  <a14:hiddenLine xmlns:a14="http://schemas.microsoft.com/office/drawing/2010/main" xmlns="" w="9525">
+                  <a14:hiddenLine xmlns="" xmlns:a14="http://schemas.microsoft.com/office/drawing/2010/main" w="9525">
                     <a:solidFill>
                       <a:srgbClr val="000000"/>
                     </a:solidFill>
@@ -10045,7 +10045,7 @@
               </a:ln>
               <a:extLst>
                 <a:ext uri="{91240B29-F687-4f45-9708-019B960494DF}">
-                  <a14:hiddenLine xmlns:a14="http://schemas.microsoft.com/office/drawing/2010/main" xmlns="" w="9525">
+                  <a14:hiddenLine xmlns="" xmlns:a14="http://schemas.microsoft.com/office/drawing/2010/main" w="9525">
                     <a:solidFill>
                       <a:srgbClr val="000000"/>
                     </a:solidFill>
@@ -10155,7 +10155,7 @@
               </a:ln>
               <a:extLst>
                 <a:ext uri="{91240B29-F687-4f45-9708-019B960494DF}">
-                  <a14:hiddenLine xmlns:a14="http://schemas.microsoft.com/office/drawing/2010/main" xmlns="" w="9525">
+                  <a14:hiddenLine xmlns="" xmlns:a14="http://schemas.microsoft.com/office/drawing/2010/main" w="9525">
                     <a:solidFill>
                       <a:srgbClr val="000000"/>
                     </a:solidFill>
@@ -10239,7 +10239,7 @@
               </a:ln>
               <a:extLst>
                 <a:ext uri="{91240B29-F687-4f45-9708-019B960494DF}">
-                  <a14:hiddenLine xmlns:a14="http://schemas.microsoft.com/office/drawing/2010/main" xmlns="" w="9525">
+                  <a14:hiddenLine xmlns="" xmlns:a14="http://schemas.microsoft.com/office/drawing/2010/main" w="9525">
                     <a:solidFill>
                       <a:srgbClr val="000000"/>
                     </a:solidFill>
@@ -10301,7 +10301,7 @@
               </a:ln>
               <a:extLst>
                 <a:ext uri="{91240B29-F687-4f45-9708-019B960494DF}">
-                  <a14:hiddenLine xmlns:a14="http://schemas.microsoft.com/office/drawing/2010/main" xmlns="" w="9525">
+                  <a14:hiddenLine xmlns="" xmlns:a14="http://schemas.microsoft.com/office/drawing/2010/main" w="9525">
                     <a:solidFill>
                       <a:srgbClr val="000000"/>
                     </a:solidFill>
@@ -10363,7 +10363,7 @@
               </a:ln>
               <a:extLst>
                 <a:ext uri="{91240B29-F687-4f45-9708-019B960494DF}">
-                  <a14:hiddenLine xmlns:a14="http://schemas.microsoft.com/office/drawing/2010/main" xmlns="" w="9525">
+                  <a14:hiddenLine xmlns="" xmlns:a14="http://schemas.microsoft.com/office/drawing/2010/main" w="9525">
                     <a:solidFill>
                       <a:srgbClr val="000000"/>
                     </a:solidFill>
@@ -10453,7 +10453,7 @@
               </a:ln>
               <a:extLst>
                 <a:ext uri="{91240B29-F687-4f45-9708-019B960494DF}">
-                  <a14:hiddenLine xmlns:a14="http://schemas.microsoft.com/office/drawing/2010/main" xmlns="" w="9525">
+                  <a14:hiddenLine xmlns="" xmlns:a14="http://schemas.microsoft.com/office/drawing/2010/main" w="9525">
                     <a:solidFill>
                       <a:srgbClr val="000000"/>
                     </a:solidFill>
@@ -10487,7 +10487,7 @@
               </a:ln>
               <a:extLst>
                 <a:ext uri="{91240B29-F687-4f45-9708-019B960494DF}">
-                  <a14:hiddenLine xmlns:a14="http://schemas.microsoft.com/office/drawing/2010/main" xmlns="" w="9525">
+                  <a14:hiddenLine xmlns="" xmlns:a14="http://schemas.microsoft.com/office/drawing/2010/main" w="9525">
                     <a:solidFill>
                       <a:srgbClr val="000000"/>
                     </a:solidFill>
@@ -10552,7 +10552,7 @@
               </a:ln>
               <a:extLst>
                 <a:ext uri="{91240B29-F687-4f45-9708-019B960494DF}">
-                  <a14:hiddenLine xmlns:a14="http://schemas.microsoft.com/office/drawing/2010/main" xmlns="" w="9525">
+                  <a14:hiddenLine xmlns="" xmlns:a14="http://schemas.microsoft.com/office/drawing/2010/main" w="9525">
                     <a:solidFill>
                       <a:srgbClr val="000000"/>
                     </a:solidFill>
@@ -10642,7 +10642,7 @@
               </a:ln>
               <a:extLst>
                 <a:ext uri="{91240B29-F687-4f45-9708-019B960494DF}">
-                  <a14:hiddenLine xmlns:a14="http://schemas.microsoft.com/office/drawing/2010/main" xmlns="" w="9525">
+                  <a14:hiddenLine xmlns="" xmlns:a14="http://schemas.microsoft.com/office/drawing/2010/main" w="9525">
                     <a:solidFill>
                       <a:srgbClr val="000000"/>
                     </a:solidFill>
@@ -10704,7 +10704,7 @@
               </a:ln>
               <a:extLst>
                 <a:ext uri="{91240B29-F687-4f45-9708-019B960494DF}">
-                  <a14:hiddenLine xmlns:a14="http://schemas.microsoft.com/office/drawing/2010/main" xmlns="" w="9525">
+                  <a14:hiddenLine xmlns="" xmlns:a14="http://schemas.microsoft.com/office/drawing/2010/main" w="9525">
                     <a:solidFill>
                       <a:srgbClr val="000000"/>
                     </a:solidFill>
@@ -10794,7 +10794,7 @@
               </a:ln>
               <a:extLst>
                 <a:ext uri="{91240B29-F687-4f45-9708-019B960494DF}">
-                  <a14:hiddenLine xmlns:a14="http://schemas.microsoft.com/office/drawing/2010/main" xmlns="" w="9525">
+                  <a14:hiddenLine xmlns="" xmlns:a14="http://schemas.microsoft.com/office/drawing/2010/main" w="9525">
                     <a:solidFill>
                       <a:srgbClr val="000000"/>
                     </a:solidFill>
@@ -10859,7 +10859,7 @@
               </a:ln>
               <a:extLst>
                 <a:ext uri="{91240B29-F687-4f45-9708-019B960494DF}">
-                  <a14:hiddenLine xmlns:a14="http://schemas.microsoft.com/office/drawing/2010/main" xmlns="" w="9525">
+                  <a14:hiddenLine xmlns="" xmlns:a14="http://schemas.microsoft.com/office/drawing/2010/main" w="9525">
                     <a:solidFill>
                       <a:srgbClr val="000000"/>
                     </a:solidFill>
@@ -10921,7 +10921,7 @@
               </a:ln>
               <a:extLst>
                 <a:ext uri="{91240B29-F687-4f45-9708-019B960494DF}">
-                  <a14:hiddenLine xmlns:a14="http://schemas.microsoft.com/office/drawing/2010/main" xmlns="" w="9525">
+                  <a14:hiddenLine xmlns="" xmlns:a14="http://schemas.microsoft.com/office/drawing/2010/main" w="9525">
                     <a:solidFill>
                       <a:srgbClr val="000000"/>
                     </a:solidFill>
@@ -11011,7 +11011,7 @@
               </a:ln>
               <a:extLst>
                 <a:ext uri="{91240B29-F687-4f45-9708-019B960494DF}">
-                  <a14:hiddenLine xmlns:a14="http://schemas.microsoft.com/office/drawing/2010/main" xmlns="" w="9525">
+                  <a14:hiddenLine xmlns="" xmlns:a14="http://schemas.microsoft.com/office/drawing/2010/main" w="9525">
                     <a:solidFill>
                       <a:srgbClr val="000000"/>
                     </a:solidFill>
@@ -11101,7 +11101,7 @@
               </a:ln>
               <a:extLst>
                 <a:ext uri="{91240B29-F687-4f45-9708-019B960494DF}">
-                  <a14:hiddenLine xmlns:a14="http://schemas.microsoft.com/office/drawing/2010/main" xmlns="" w="9525">
+                  <a14:hiddenLine xmlns="" xmlns:a14="http://schemas.microsoft.com/office/drawing/2010/main" w="9525">
                     <a:solidFill>
                       <a:srgbClr val="000000"/>
                     </a:solidFill>
@@ -11166,7 +11166,7 @@
               </a:ln>
               <a:extLst>
                 <a:ext uri="{91240B29-F687-4f45-9708-019B960494DF}">
-                  <a14:hiddenLine xmlns:a14="http://schemas.microsoft.com/office/drawing/2010/main" xmlns="" w="9525">
+                  <a14:hiddenLine xmlns="" xmlns:a14="http://schemas.microsoft.com/office/drawing/2010/main" w="9525">
                     <a:solidFill>
                       <a:srgbClr val="000000"/>
                     </a:solidFill>
@@ -11286,7 +11286,7 @@
               </a:ln>
               <a:extLst>
                 <a:ext uri="{91240B29-F687-4f45-9708-019B960494DF}">
-                  <a14:hiddenLine xmlns:a14="http://schemas.microsoft.com/office/drawing/2010/main" xmlns="" w="9525">
+                  <a14:hiddenLine xmlns="" xmlns:a14="http://schemas.microsoft.com/office/drawing/2010/main" w="9525">
                     <a:solidFill>
                       <a:srgbClr val="000000"/>
                     </a:solidFill>
@@ -11367,7 +11367,7 @@
               </a:ln>
               <a:extLst>
                 <a:ext uri="{91240B29-F687-4f45-9708-019B960494DF}">
-                  <a14:hiddenLine xmlns:a14="http://schemas.microsoft.com/office/drawing/2010/main" xmlns="" w="9525">
+                  <a14:hiddenLine xmlns="" xmlns:a14="http://schemas.microsoft.com/office/drawing/2010/main" w="9525">
                     <a:solidFill>
                       <a:srgbClr val="000000"/>
                     </a:solidFill>
@@ -11482,7 +11482,7 @@
               </a:ln>
               <a:extLst>
                 <a:ext uri="{91240B29-F687-4f45-9708-019B960494DF}">
-                  <a14:hiddenLine xmlns:a14="http://schemas.microsoft.com/office/drawing/2010/main" xmlns="" w="9525">
+                  <a14:hiddenLine xmlns="" xmlns:a14="http://schemas.microsoft.com/office/drawing/2010/main" w="9525">
                     <a:solidFill>
                       <a:srgbClr val="000000"/>
                     </a:solidFill>
@@ -11572,7 +11572,7 @@
               </a:ln>
               <a:extLst>
                 <a:ext uri="{91240B29-F687-4f45-9708-019B960494DF}">
-                  <a14:hiddenLine xmlns:a14="http://schemas.microsoft.com/office/drawing/2010/main" xmlns="" w="9525">
+                  <a14:hiddenLine xmlns="" xmlns:a14="http://schemas.microsoft.com/office/drawing/2010/main" w="9525">
                     <a:solidFill>
                       <a:srgbClr val="000000"/>
                     </a:solidFill>
@@ -11637,7 +11637,7 @@
               </a:ln>
               <a:extLst>
                 <a:ext uri="{91240B29-F687-4f45-9708-019B960494DF}">
-                  <a14:hiddenLine xmlns:a14="http://schemas.microsoft.com/office/drawing/2010/main" xmlns="" w="9525">
+                  <a14:hiddenLine xmlns="" xmlns:a14="http://schemas.microsoft.com/office/drawing/2010/main" w="9525">
                     <a:solidFill>
                       <a:srgbClr val="000000"/>
                     </a:solidFill>
@@ -11727,7 +11727,7 @@
               </a:ln>
               <a:extLst>
                 <a:ext uri="{91240B29-F687-4f45-9708-019B960494DF}">
-                  <a14:hiddenLine xmlns:a14="http://schemas.microsoft.com/office/drawing/2010/main" xmlns="" w="9525">
+                  <a14:hiddenLine xmlns="" xmlns:a14="http://schemas.microsoft.com/office/drawing/2010/main" w="9525">
                     <a:solidFill>
                       <a:srgbClr val="000000"/>
                     </a:solidFill>
@@ -11795,7 +11795,7 @@
               </a:ln>
               <a:extLst>
                 <a:ext uri="{91240B29-F687-4f45-9708-019B960494DF}">
-                  <a14:hiddenLine xmlns:a14="http://schemas.microsoft.com/office/drawing/2010/main" xmlns="" w="9525">
+                  <a14:hiddenLine xmlns="" xmlns:a14="http://schemas.microsoft.com/office/drawing/2010/main" w="9525">
                     <a:solidFill>
                       <a:srgbClr val="000000"/>
                     </a:solidFill>
@@ -11885,7 +11885,7 @@
               </a:ln>
               <a:extLst>
                 <a:ext uri="{91240B29-F687-4f45-9708-019B960494DF}">
-                  <a14:hiddenLine xmlns:a14="http://schemas.microsoft.com/office/drawing/2010/main" xmlns="" w="9525">
+                  <a14:hiddenLine xmlns="" xmlns:a14="http://schemas.microsoft.com/office/drawing/2010/main" w="9525">
                     <a:solidFill>
                       <a:srgbClr val="000000"/>
                     </a:solidFill>
@@ -11953,7 +11953,7 @@
               </a:ln>
               <a:extLst>
                 <a:ext uri="{91240B29-F687-4f45-9708-019B960494DF}">
-                  <a14:hiddenLine xmlns:a14="http://schemas.microsoft.com/office/drawing/2010/main" xmlns="" w="9525">
+                  <a14:hiddenLine xmlns="" xmlns:a14="http://schemas.microsoft.com/office/drawing/2010/main" w="9525">
                     <a:solidFill>
                       <a:srgbClr val="000000"/>
                     </a:solidFill>
@@ -12043,7 +12043,7 @@
               </a:ln>
               <a:extLst>
                 <a:ext uri="{91240B29-F687-4f45-9708-019B960494DF}">
-                  <a14:hiddenLine xmlns:a14="http://schemas.microsoft.com/office/drawing/2010/main" xmlns="" w="9525">
+                  <a14:hiddenLine xmlns="" xmlns:a14="http://schemas.microsoft.com/office/drawing/2010/main" w="9525">
                     <a:solidFill>
                       <a:srgbClr val="000000"/>
                     </a:solidFill>
@@ -12077,7 +12077,7 @@
               </a:ln>
               <a:extLst>
                 <a:ext uri="{91240B29-F687-4f45-9708-019B960494DF}">
-                  <a14:hiddenLine xmlns:a14="http://schemas.microsoft.com/office/drawing/2010/main" xmlns="" w="9525">
+                  <a14:hiddenLine xmlns="" xmlns:a14="http://schemas.microsoft.com/office/drawing/2010/main" w="9525">
                     <a:solidFill>
                       <a:srgbClr val="000000"/>
                     </a:solidFill>

</xml_diff>

<commit_message>
Planeación para hacer el video! no muy importantes
</commit_message>
<xml_diff>
--- a/requerimentos/Planificación.pptx
+++ b/requerimentos/Planificación.pptx
@@ -175,7 +175,7 @@
           <a:noFill/>
           <a:extLst>
             <a:ext uri="{909E8E84-426E-40dd-AFC4-6F175D3DCCD1}">
-              <a14:hiddenFill xmlns="" xmlns:a14="http://schemas.microsoft.com/office/drawing/2010/main">
+              <a14:hiddenFill xmlns:a14="http://schemas.microsoft.com/office/drawing/2010/main" xmlns="">
                 <a:solidFill>
                   <a:srgbClr val="FFFFFF"/>
                 </a:solidFill>
@@ -234,7 +234,7 @@
             </a:ln>
             <a:extLst>
               <a:ext uri="{91240B29-F687-4f45-9708-019B960494DF}">
-                <a14:hiddenLine xmlns="" xmlns:a14="http://schemas.microsoft.com/office/drawing/2010/main" w="9525">
+                <a14:hiddenLine xmlns:a14="http://schemas.microsoft.com/office/drawing/2010/main" xmlns="" w="9525">
                   <a:solidFill>
                     <a:srgbClr val="000000"/>
                   </a:solidFill>
@@ -324,7 +324,7 @@
             </a:ln>
             <a:extLst>
               <a:ext uri="{91240B29-F687-4f45-9708-019B960494DF}">
-                <a14:hiddenLine xmlns="" xmlns:a14="http://schemas.microsoft.com/office/drawing/2010/main" w="9525">
+                <a14:hiddenLine xmlns:a14="http://schemas.microsoft.com/office/drawing/2010/main" xmlns="" w="9525">
                   <a:solidFill>
                     <a:srgbClr val="000000"/>
                   </a:solidFill>
@@ -414,7 +414,7 @@
             </a:ln>
             <a:extLst>
               <a:ext uri="{91240B29-F687-4f45-9708-019B960494DF}">
-                <a14:hiddenLine xmlns="" xmlns:a14="http://schemas.microsoft.com/office/drawing/2010/main" w="9525">
+                <a14:hiddenLine xmlns:a14="http://schemas.microsoft.com/office/drawing/2010/main" xmlns="" w="9525">
                   <a:solidFill>
                     <a:srgbClr val="000000"/>
                   </a:solidFill>
@@ -448,7 +448,7 @@
             </a:ln>
             <a:extLst>
               <a:ext uri="{91240B29-F687-4f45-9708-019B960494DF}">
-                <a14:hiddenLine xmlns="" xmlns:a14="http://schemas.microsoft.com/office/drawing/2010/main" w="9525">
+                <a14:hiddenLine xmlns:a14="http://schemas.microsoft.com/office/drawing/2010/main" xmlns="" w="9525">
                   <a:solidFill>
                     <a:srgbClr val="000000"/>
                   </a:solidFill>
@@ -538,7 +538,7 @@
             </a:ln>
             <a:extLst>
               <a:ext uri="{91240B29-F687-4f45-9708-019B960494DF}">
-                <a14:hiddenLine xmlns="" xmlns:a14="http://schemas.microsoft.com/office/drawing/2010/main" w="9525">
+                <a14:hiddenLine xmlns:a14="http://schemas.microsoft.com/office/drawing/2010/main" xmlns="" w="9525">
                   <a:solidFill>
                     <a:srgbClr val="000000"/>
                   </a:solidFill>
@@ -600,7 +600,7 @@
             </a:ln>
             <a:extLst>
               <a:ext uri="{91240B29-F687-4f45-9708-019B960494DF}">
-                <a14:hiddenLine xmlns="" xmlns:a14="http://schemas.microsoft.com/office/drawing/2010/main" w="9525">
+                <a14:hiddenLine xmlns:a14="http://schemas.microsoft.com/office/drawing/2010/main" xmlns="" w="9525">
                   <a:solidFill>
                     <a:srgbClr val="000000"/>
                   </a:solidFill>
@@ -662,7 +662,7 @@
             </a:ln>
             <a:extLst>
               <a:ext uri="{91240B29-F687-4f45-9708-019B960494DF}">
-                <a14:hiddenLine xmlns="" xmlns:a14="http://schemas.microsoft.com/office/drawing/2010/main" w="9525">
+                <a14:hiddenLine xmlns:a14="http://schemas.microsoft.com/office/drawing/2010/main" xmlns="" w="9525">
                   <a:solidFill>
                     <a:srgbClr val="000000"/>
                   </a:solidFill>
@@ -752,7 +752,7 @@
             </a:ln>
             <a:extLst>
               <a:ext uri="{91240B29-F687-4f45-9708-019B960494DF}">
-                <a14:hiddenLine xmlns="" xmlns:a14="http://schemas.microsoft.com/office/drawing/2010/main" w="9525">
+                <a14:hiddenLine xmlns:a14="http://schemas.microsoft.com/office/drawing/2010/main" xmlns="" w="9525">
                   <a:solidFill>
                     <a:srgbClr val="000000"/>
                   </a:solidFill>
@@ -814,7 +814,7 @@
             </a:ln>
             <a:extLst>
               <a:ext uri="{91240B29-F687-4f45-9708-019B960494DF}">
-                <a14:hiddenLine xmlns="" xmlns:a14="http://schemas.microsoft.com/office/drawing/2010/main" w="9525">
+                <a14:hiddenLine xmlns:a14="http://schemas.microsoft.com/office/drawing/2010/main" xmlns="" w="9525">
                   <a:solidFill>
                     <a:srgbClr val="000000"/>
                   </a:solidFill>
@@ -876,7 +876,7 @@
             </a:ln>
             <a:extLst>
               <a:ext uri="{91240B29-F687-4f45-9708-019B960494DF}">
-                <a14:hiddenLine xmlns="" xmlns:a14="http://schemas.microsoft.com/office/drawing/2010/main" w="9525">
+                <a14:hiddenLine xmlns:a14="http://schemas.microsoft.com/office/drawing/2010/main" xmlns="" w="9525">
                   <a:solidFill>
                     <a:srgbClr val="000000"/>
                   </a:solidFill>
@@ -966,7 +966,7 @@
             </a:ln>
             <a:extLst>
               <a:ext uri="{91240B29-F687-4f45-9708-019B960494DF}">
-                <a14:hiddenLine xmlns="" xmlns:a14="http://schemas.microsoft.com/office/drawing/2010/main" w="9525">
+                <a14:hiddenLine xmlns:a14="http://schemas.microsoft.com/office/drawing/2010/main" xmlns="" w="9525">
                   <a:solidFill>
                     <a:srgbClr val="000000"/>
                   </a:solidFill>
@@ -1056,7 +1056,7 @@
             </a:ln>
             <a:extLst>
               <a:ext uri="{91240B29-F687-4f45-9708-019B960494DF}">
-                <a14:hiddenLine xmlns="" xmlns:a14="http://schemas.microsoft.com/office/drawing/2010/main" w="9525">
+                <a14:hiddenLine xmlns:a14="http://schemas.microsoft.com/office/drawing/2010/main" xmlns="" w="9525">
                   <a:solidFill>
                     <a:srgbClr val="000000"/>
                   </a:solidFill>
@@ -1118,7 +1118,7 @@
             </a:ln>
             <a:extLst>
               <a:ext uri="{91240B29-F687-4f45-9708-019B960494DF}">
-                <a14:hiddenLine xmlns="" xmlns:a14="http://schemas.microsoft.com/office/drawing/2010/main" w="9525">
+                <a14:hiddenLine xmlns:a14="http://schemas.microsoft.com/office/drawing/2010/main" xmlns="" w="9525">
                   <a:solidFill>
                     <a:srgbClr val="000000"/>
                   </a:solidFill>
@@ -1228,7 +1228,7 @@
             </a:ln>
             <a:extLst>
               <a:ext uri="{91240B29-F687-4f45-9708-019B960494DF}">
-                <a14:hiddenLine xmlns="" xmlns:a14="http://schemas.microsoft.com/office/drawing/2010/main" w="9525">
+                <a14:hiddenLine xmlns:a14="http://schemas.microsoft.com/office/drawing/2010/main" xmlns="" w="9525">
                   <a:solidFill>
                     <a:srgbClr val="000000"/>
                   </a:solidFill>
@@ -1290,7 +1290,7 @@
             </a:ln>
             <a:extLst>
               <a:ext uri="{91240B29-F687-4f45-9708-019B960494DF}">
-                <a14:hiddenLine xmlns="" xmlns:a14="http://schemas.microsoft.com/office/drawing/2010/main" w="9525">
+                <a14:hiddenLine xmlns:a14="http://schemas.microsoft.com/office/drawing/2010/main" xmlns="" w="9525">
                   <a:solidFill>
                     <a:srgbClr val="000000"/>
                   </a:solidFill>
@@ -1380,7 +1380,7 @@
             </a:ln>
             <a:extLst>
               <a:ext uri="{91240B29-F687-4f45-9708-019B960494DF}">
-                <a14:hiddenLine xmlns="" xmlns:a14="http://schemas.microsoft.com/office/drawing/2010/main" w="9525">
+                <a14:hiddenLine xmlns:a14="http://schemas.microsoft.com/office/drawing/2010/main" xmlns="" w="9525">
                   <a:solidFill>
                     <a:srgbClr val="000000"/>
                   </a:solidFill>
@@ -1470,7 +1470,7 @@
             </a:ln>
             <a:extLst>
               <a:ext uri="{91240B29-F687-4f45-9708-019B960494DF}">
-                <a14:hiddenLine xmlns="" xmlns:a14="http://schemas.microsoft.com/office/drawing/2010/main" w="9525">
+                <a14:hiddenLine xmlns:a14="http://schemas.microsoft.com/office/drawing/2010/main" xmlns="" w="9525">
                   <a:solidFill>
                     <a:srgbClr val="000000"/>
                   </a:solidFill>
@@ -1532,7 +1532,7 @@
             </a:ln>
             <a:extLst>
               <a:ext uri="{91240B29-F687-4f45-9708-019B960494DF}">
-                <a14:hiddenLine xmlns="" xmlns:a14="http://schemas.microsoft.com/office/drawing/2010/main" w="9525">
+                <a14:hiddenLine xmlns:a14="http://schemas.microsoft.com/office/drawing/2010/main" xmlns="" w="9525">
                   <a:solidFill>
                     <a:srgbClr val="000000"/>
                   </a:solidFill>
@@ -1622,7 +1622,7 @@
             </a:ln>
             <a:extLst>
               <a:ext uri="{91240B29-F687-4f45-9708-019B960494DF}">
-                <a14:hiddenLine xmlns="" xmlns:a14="http://schemas.microsoft.com/office/drawing/2010/main" w="9525">
+                <a14:hiddenLine xmlns:a14="http://schemas.microsoft.com/office/drawing/2010/main" xmlns="" w="9525">
                   <a:solidFill>
                     <a:srgbClr val="000000"/>
                   </a:solidFill>
@@ -1712,7 +1712,7 @@
             </a:ln>
             <a:extLst>
               <a:ext uri="{91240B29-F687-4f45-9708-019B960494DF}">
-                <a14:hiddenLine xmlns="" xmlns:a14="http://schemas.microsoft.com/office/drawing/2010/main" w="9525">
+                <a14:hiddenLine xmlns:a14="http://schemas.microsoft.com/office/drawing/2010/main" xmlns="" w="9525">
                   <a:solidFill>
                     <a:srgbClr val="000000"/>
                   </a:solidFill>
@@ -1768,7 +1768,7 @@
             </a:ln>
             <a:extLst>
               <a:ext uri="{91240B29-F687-4f45-9708-019B960494DF}">
-                <a14:hiddenLine xmlns="" xmlns:a14="http://schemas.microsoft.com/office/drawing/2010/main" w="9525">
+                <a14:hiddenLine xmlns:a14="http://schemas.microsoft.com/office/drawing/2010/main" xmlns="" w="9525">
                   <a:solidFill>
                     <a:srgbClr val="000000"/>
                   </a:solidFill>
@@ -1858,7 +1858,7 @@
             </a:ln>
             <a:extLst>
               <a:ext uri="{91240B29-F687-4f45-9708-019B960494DF}">
-                <a14:hiddenLine xmlns="" xmlns:a14="http://schemas.microsoft.com/office/drawing/2010/main" w="9525">
+                <a14:hiddenLine xmlns:a14="http://schemas.microsoft.com/office/drawing/2010/main" xmlns="" w="9525">
                   <a:solidFill>
                     <a:srgbClr val="000000"/>
                   </a:solidFill>
@@ -1914,7 +1914,7 @@
             </a:ln>
             <a:extLst>
               <a:ext uri="{91240B29-F687-4f45-9708-019B960494DF}">
-                <a14:hiddenLine xmlns="" xmlns:a14="http://schemas.microsoft.com/office/drawing/2010/main" w="9525">
+                <a14:hiddenLine xmlns:a14="http://schemas.microsoft.com/office/drawing/2010/main" xmlns="" w="9525">
                   <a:solidFill>
                     <a:srgbClr val="000000"/>
                   </a:solidFill>
@@ -2004,7 +2004,7 @@
             </a:ln>
             <a:extLst>
               <a:ext uri="{91240B29-F687-4f45-9708-019B960494DF}">
-                <a14:hiddenLine xmlns="" xmlns:a14="http://schemas.microsoft.com/office/drawing/2010/main" w="9525">
+                <a14:hiddenLine xmlns:a14="http://schemas.microsoft.com/office/drawing/2010/main" xmlns="" w="9525">
                   <a:solidFill>
                     <a:srgbClr val="000000"/>
                   </a:solidFill>
@@ -2072,7 +2072,7 @@
             </a:ln>
             <a:extLst>
               <a:ext uri="{91240B29-F687-4f45-9708-019B960494DF}">
-                <a14:hiddenLine xmlns="" xmlns:a14="http://schemas.microsoft.com/office/drawing/2010/main" w="9525">
+                <a14:hiddenLine xmlns:a14="http://schemas.microsoft.com/office/drawing/2010/main" xmlns="" w="9525">
                   <a:solidFill>
                     <a:srgbClr val="000000"/>
                   </a:solidFill>
@@ -2162,7 +2162,7 @@
             </a:ln>
             <a:extLst>
               <a:ext uri="{91240B29-F687-4f45-9708-019B960494DF}">
-                <a14:hiddenLine xmlns="" xmlns:a14="http://schemas.microsoft.com/office/drawing/2010/main" w="9525">
+                <a14:hiddenLine xmlns:a14="http://schemas.microsoft.com/office/drawing/2010/main" xmlns="" w="9525">
                   <a:solidFill>
                     <a:srgbClr val="000000"/>
                   </a:solidFill>
@@ -2230,7 +2230,7 @@
             </a:ln>
             <a:extLst>
               <a:ext uri="{91240B29-F687-4f45-9708-019B960494DF}">
-                <a14:hiddenLine xmlns="" xmlns:a14="http://schemas.microsoft.com/office/drawing/2010/main" w="9525">
+                <a14:hiddenLine xmlns:a14="http://schemas.microsoft.com/office/drawing/2010/main" xmlns="" w="9525">
                   <a:solidFill>
                     <a:srgbClr val="000000"/>
                   </a:solidFill>
@@ -2320,7 +2320,7 @@
             </a:ln>
             <a:extLst>
               <a:ext uri="{91240B29-F687-4f45-9708-019B960494DF}">
-                <a14:hiddenLine xmlns="" xmlns:a14="http://schemas.microsoft.com/office/drawing/2010/main" w="9525">
+                <a14:hiddenLine xmlns:a14="http://schemas.microsoft.com/office/drawing/2010/main" xmlns="" w="9525">
                   <a:solidFill>
                     <a:srgbClr val="000000"/>
                   </a:solidFill>
@@ -2354,7 +2354,7 @@
             </a:ln>
             <a:extLst>
               <a:ext uri="{91240B29-F687-4f45-9708-019B960494DF}">
-                <a14:hiddenLine xmlns="" xmlns:a14="http://schemas.microsoft.com/office/drawing/2010/main" w="9525">
+                <a14:hiddenLine xmlns:a14="http://schemas.microsoft.com/office/drawing/2010/main" xmlns="" w="9525">
                   <a:solidFill>
                     <a:srgbClr val="000000"/>
                   </a:solidFill>
@@ -2444,7 +2444,7 @@
             </a:ln>
             <a:extLst>
               <a:ext uri="{91240B29-F687-4f45-9708-019B960494DF}">
-                <a14:hiddenLine xmlns="" xmlns:a14="http://schemas.microsoft.com/office/drawing/2010/main" w="9525">
+                <a14:hiddenLine xmlns:a14="http://schemas.microsoft.com/office/drawing/2010/main" xmlns="" w="9525">
                   <a:solidFill>
                     <a:srgbClr val="000000"/>
                   </a:solidFill>
@@ -2506,7 +2506,7 @@
             </a:ln>
             <a:extLst>
               <a:ext uri="{91240B29-F687-4f45-9708-019B960494DF}">
-                <a14:hiddenLine xmlns="" xmlns:a14="http://schemas.microsoft.com/office/drawing/2010/main" w="9525">
+                <a14:hiddenLine xmlns:a14="http://schemas.microsoft.com/office/drawing/2010/main" xmlns="" w="9525">
                   <a:solidFill>
                     <a:srgbClr val="000000"/>
                   </a:solidFill>
@@ -2568,7 +2568,7 @@
             </a:ln>
             <a:extLst>
               <a:ext uri="{91240B29-F687-4f45-9708-019B960494DF}">
-                <a14:hiddenLine xmlns="" xmlns:a14="http://schemas.microsoft.com/office/drawing/2010/main" w="9525">
+                <a14:hiddenLine xmlns:a14="http://schemas.microsoft.com/office/drawing/2010/main" xmlns="" w="9525">
                   <a:solidFill>
                     <a:srgbClr val="000000"/>
                   </a:solidFill>
@@ -2658,7 +2658,7 @@
             </a:ln>
             <a:extLst>
               <a:ext uri="{91240B29-F687-4f45-9708-019B960494DF}">
-                <a14:hiddenLine xmlns="" xmlns:a14="http://schemas.microsoft.com/office/drawing/2010/main" w="9525">
+                <a14:hiddenLine xmlns:a14="http://schemas.microsoft.com/office/drawing/2010/main" xmlns="" w="9525">
                   <a:solidFill>
                     <a:srgbClr val="000000"/>
                   </a:solidFill>
@@ -2726,7 +2726,7 @@
             </a:ln>
             <a:extLst>
               <a:ext uri="{91240B29-F687-4f45-9708-019B960494DF}">
-                <a14:hiddenLine xmlns="" xmlns:a14="http://schemas.microsoft.com/office/drawing/2010/main" w="9525">
+                <a14:hiddenLine xmlns:a14="http://schemas.microsoft.com/office/drawing/2010/main" xmlns="" w="9525">
                   <a:solidFill>
                     <a:srgbClr val="000000"/>
                   </a:solidFill>
@@ -2788,7 +2788,7 @@
             </a:ln>
             <a:extLst>
               <a:ext uri="{91240B29-F687-4f45-9708-019B960494DF}">
-                <a14:hiddenLine xmlns="" xmlns:a14="http://schemas.microsoft.com/office/drawing/2010/main" w="9525">
+                <a14:hiddenLine xmlns:a14="http://schemas.microsoft.com/office/drawing/2010/main" xmlns="" w="9525">
                   <a:solidFill>
                     <a:srgbClr val="000000"/>
                   </a:solidFill>
@@ -2878,7 +2878,7 @@
             </a:ln>
             <a:extLst>
               <a:ext uri="{91240B29-F687-4f45-9708-019B960494DF}">
-                <a14:hiddenLine xmlns="" xmlns:a14="http://schemas.microsoft.com/office/drawing/2010/main" w="9525">
+                <a14:hiddenLine xmlns:a14="http://schemas.microsoft.com/office/drawing/2010/main" xmlns="" w="9525">
                   <a:solidFill>
                     <a:srgbClr val="000000"/>
                   </a:solidFill>
@@ -2940,7 +2940,7 @@
             </a:ln>
             <a:extLst>
               <a:ext uri="{91240B29-F687-4f45-9708-019B960494DF}">
-                <a14:hiddenLine xmlns="" xmlns:a14="http://schemas.microsoft.com/office/drawing/2010/main" w="9525">
+                <a14:hiddenLine xmlns:a14="http://schemas.microsoft.com/office/drawing/2010/main" xmlns="" w="9525">
                   <a:solidFill>
                     <a:srgbClr val="000000"/>
                   </a:solidFill>
@@ -3030,7 +3030,7 @@
             </a:ln>
             <a:extLst>
               <a:ext uri="{91240B29-F687-4f45-9708-019B960494DF}">
-                <a14:hiddenLine xmlns="" xmlns:a14="http://schemas.microsoft.com/office/drawing/2010/main" w="9525">
+                <a14:hiddenLine xmlns:a14="http://schemas.microsoft.com/office/drawing/2010/main" xmlns="" w="9525">
                   <a:solidFill>
                     <a:srgbClr val="000000"/>
                   </a:solidFill>
@@ -3092,7 +3092,7 @@
             </a:ln>
             <a:extLst>
               <a:ext uri="{91240B29-F687-4f45-9708-019B960494DF}">
-                <a14:hiddenLine xmlns="" xmlns:a14="http://schemas.microsoft.com/office/drawing/2010/main" w="9525">
+                <a14:hiddenLine xmlns:a14="http://schemas.microsoft.com/office/drawing/2010/main" xmlns="" w="9525">
                   <a:solidFill>
                     <a:srgbClr val="000000"/>
                   </a:solidFill>
@@ -3182,7 +3182,7 @@
             </a:ln>
             <a:extLst>
               <a:ext uri="{91240B29-F687-4f45-9708-019B960494DF}">
-                <a14:hiddenLine xmlns="" xmlns:a14="http://schemas.microsoft.com/office/drawing/2010/main" w="9525">
+                <a14:hiddenLine xmlns:a14="http://schemas.microsoft.com/office/drawing/2010/main" xmlns="" w="9525">
                   <a:solidFill>
                     <a:srgbClr val="000000"/>
                   </a:solidFill>
@@ -3216,7 +3216,7 @@
             </a:ln>
             <a:extLst>
               <a:ext uri="{91240B29-F687-4f45-9708-019B960494DF}">
-                <a14:hiddenLine xmlns="" xmlns:a14="http://schemas.microsoft.com/office/drawing/2010/main" w="9525">
+                <a14:hiddenLine xmlns:a14="http://schemas.microsoft.com/office/drawing/2010/main" xmlns="" w="9525">
                   <a:solidFill>
                     <a:srgbClr val="000000"/>
                   </a:solidFill>
@@ -3281,7 +3281,7 @@
             </a:ln>
             <a:extLst>
               <a:ext uri="{91240B29-F687-4f45-9708-019B960494DF}">
-                <a14:hiddenLine xmlns="" xmlns:a14="http://schemas.microsoft.com/office/drawing/2010/main" w="9525">
+                <a14:hiddenLine xmlns:a14="http://schemas.microsoft.com/office/drawing/2010/main" xmlns="" w="9525">
                   <a:solidFill>
                     <a:srgbClr val="000000"/>
                   </a:solidFill>
@@ -3371,7 +3371,7 @@
             </a:ln>
             <a:extLst>
               <a:ext uri="{91240B29-F687-4f45-9708-019B960494DF}">
-                <a14:hiddenLine xmlns="" xmlns:a14="http://schemas.microsoft.com/office/drawing/2010/main" w="9525">
+                <a14:hiddenLine xmlns:a14="http://schemas.microsoft.com/office/drawing/2010/main" xmlns="" w="9525">
                   <a:solidFill>
                     <a:srgbClr val="000000"/>
                   </a:solidFill>
@@ -3433,7 +3433,7 @@
             </a:ln>
             <a:extLst>
               <a:ext uri="{91240B29-F687-4f45-9708-019B960494DF}">
-                <a14:hiddenLine xmlns="" xmlns:a14="http://schemas.microsoft.com/office/drawing/2010/main" w="9525">
+                <a14:hiddenLine xmlns:a14="http://schemas.microsoft.com/office/drawing/2010/main" xmlns="" w="9525">
                   <a:solidFill>
                     <a:srgbClr val="000000"/>
                   </a:solidFill>
@@ -3523,7 +3523,7 @@
             </a:ln>
             <a:extLst>
               <a:ext uri="{91240B29-F687-4f45-9708-019B960494DF}">
-                <a14:hiddenLine xmlns="" xmlns:a14="http://schemas.microsoft.com/office/drawing/2010/main" w="9525">
+                <a14:hiddenLine xmlns:a14="http://schemas.microsoft.com/office/drawing/2010/main" xmlns="" w="9525">
                   <a:solidFill>
                     <a:srgbClr val="000000"/>
                   </a:solidFill>
@@ -3613,7 +3613,7 @@
             </a:ln>
             <a:extLst>
               <a:ext uri="{91240B29-F687-4f45-9708-019B960494DF}">
-                <a14:hiddenLine xmlns="" xmlns:a14="http://schemas.microsoft.com/office/drawing/2010/main" w="9525">
+                <a14:hiddenLine xmlns:a14="http://schemas.microsoft.com/office/drawing/2010/main" xmlns="" w="9525">
                   <a:solidFill>
                     <a:srgbClr val="000000"/>
                   </a:solidFill>
@@ -3678,7 +3678,7 @@
             </a:ln>
             <a:extLst>
               <a:ext uri="{91240B29-F687-4f45-9708-019B960494DF}">
-                <a14:hiddenLine xmlns="" xmlns:a14="http://schemas.microsoft.com/office/drawing/2010/main" w="9525">
+                <a14:hiddenLine xmlns:a14="http://schemas.microsoft.com/office/drawing/2010/main" xmlns="" w="9525">
                   <a:solidFill>
                     <a:srgbClr val="000000"/>
                   </a:solidFill>
@@ -3740,7 +3740,7 @@
             </a:ln>
             <a:extLst>
               <a:ext uri="{91240B29-F687-4f45-9708-019B960494DF}">
-                <a14:hiddenLine xmlns="" xmlns:a14="http://schemas.microsoft.com/office/drawing/2010/main" w="9525">
+                <a14:hiddenLine xmlns:a14="http://schemas.microsoft.com/office/drawing/2010/main" xmlns="" w="9525">
                   <a:solidFill>
                     <a:srgbClr val="000000"/>
                   </a:solidFill>
@@ -3830,7 +3830,7 @@
             </a:ln>
             <a:extLst>
               <a:ext uri="{91240B29-F687-4f45-9708-019B960494DF}">
-                <a14:hiddenLine xmlns="" xmlns:a14="http://schemas.microsoft.com/office/drawing/2010/main" w="9525">
+                <a14:hiddenLine xmlns:a14="http://schemas.microsoft.com/office/drawing/2010/main" xmlns="" w="9525">
                   <a:solidFill>
                     <a:srgbClr val="000000"/>
                   </a:solidFill>
@@ -3920,7 +3920,7 @@
             </a:ln>
             <a:extLst>
               <a:ext uri="{91240B29-F687-4f45-9708-019B960494DF}">
-                <a14:hiddenLine xmlns="" xmlns:a14="http://schemas.microsoft.com/office/drawing/2010/main" w="9525">
+                <a14:hiddenLine xmlns:a14="http://schemas.microsoft.com/office/drawing/2010/main" xmlns="" w="9525">
                   <a:solidFill>
                     <a:srgbClr val="000000"/>
                   </a:solidFill>
@@ -3982,7 +3982,7 @@
             </a:ln>
             <a:extLst>
               <a:ext uri="{91240B29-F687-4f45-9708-019B960494DF}">
-                <a14:hiddenLine xmlns="" xmlns:a14="http://schemas.microsoft.com/office/drawing/2010/main" w="9525">
+                <a14:hiddenLine xmlns:a14="http://schemas.microsoft.com/office/drawing/2010/main" xmlns="" w="9525">
                   <a:solidFill>
                     <a:srgbClr val="000000"/>
                   </a:solidFill>
@@ -4102,7 +4102,7 @@
             </a:ln>
             <a:extLst>
               <a:ext uri="{91240B29-F687-4f45-9708-019B960494DF}">
-                <a14:hiddenLine xmlns="" xmlns:a14="http://schemas.microsoft.com/office/drawing/2010/main" w="9525">
+                <a14:hiddenLine xmlns:a14="http://schemas.microsoft.com/office/drawing/2010/main" xmlns="" w="9525">
                   <a:solidFill>
                     <a:srgbClr val="000000"/>
                   </a:solidFill>
@@ -4170,7 +4170,7 @@
             </a:ln>
             <a:extLst>
               <a:ext uri="{91240B29-F687-4f45-9708-019B960494DF}">
-                <a14:hiddenLine xmlns="" xmlns:a14="http://schemas.microsoft.com/office/drawing/2010/main" w="9525">
+                <a14:hiddenLine xmlns:a14="http://schemas.microsoft.com/office/drawing/2010/main" xmlns="" w="9525">
                   <a:solidFill>
                     <a:srgbClr val="000000"/>
                   </a:solidFill>
@@ -4260,7 +4260,7 @@
             </a:ln>
             <a:extLst>
               <a:ext uri="{91240B29-F687-4f45-9708-019B960494DF}">
-                <a14:hiddenLine xmlns="" xmlns:a14="http://schemas.microsoft.com/office/drawing/2010/main" w="9525">
+                <a14:hiddenLine xmlns:a14="http://schemas.microsoft.com/office/drawing/2010/main" xmlns="" w="9525">
                   <a:solidFill>
                     <a:srgbClr val="000000"/>
                   </a:solidFill>
@@ -4400,7 +4400,7 @@
           <a:p>
             <a:fld id="{4AAD347D-5ACD-4C99-B74B-A9C85AD731AF}" type="datetimeFigureOut">
               <a:rPr lang="en-US" smtClean="0"/>
-              <a:t>10/11/23</a:t>
+              <a:t>10/14/23</a:t>
             </a:fld>
             <a:endParaRPr lang="en-US" dirty="0"/>
           </a:p>
@@ -4667,7 +4667,7 @@
           <a:p>
             <a:fld id="{4509A250-FF31-4206-8172-F9D3106AACB1}" type="datetimeFigureOut">
               <a:rPr lang="en-US" smtClean="0"/>
-              <a:t>10/11/23</a:t>
+              <a:t>10/14/23</a:t>
             </a:fld>
             <a:endParaRPr lang="en-US" dirty="0"/>
           </a:p>
@@ -4863,7 +4863,7 @@
           <a:p>
             <a:fld id="{4AAD347D-5ACD-4C99-B74B-A9C85AD731AF}" type="datetimeFigureOut">
               <a:rPr lang="en-US" smtClean="0"/>
-              <a:t>10/11/23</a:t>
+              <a:t>10/14/23</a:t>
             </a:fld>
             <a:endParaRPr lang="en-US" dirty="0"/>
           </a:p>
@@ -5127,7 +5127,7 @@
           <a:p>
             <a:fld id="{4AAD347D-5ACD-4C99-B74B-A9C85AD731AF}" type="datetimeFigureOut">
               <a:rPr lang="en-US" smtClean="0"/>
-              <a:t>10/11/23</a:t>
+              <a:t>10/14/23</a:t>
             </a:fld>
             <a:endParaRPr lang="en-US" dirty="0"/>
           </a:p>
@@ -5562,7 +5562,7 @@
           <a:p>
             <a:fld id="{4AAD347D-5ACD-4C99-B74B-A9C85AD731AF}" type="datetimeFigureOut">
               <a:rPr lang="en-US" smtClean="0"/>
-              <a:t>10/11/23</a:t>
+              <a:t>10/14/23</a:t>
             </a:fld>
             <a:endParaRPr lang="en-US" dirty="0"/>
           </a:p>
@@ -6109,7 +6109,7 @@
           <a:p>
             <a:fld id="{4AAD347D-5ACD-4C99-B74B-A9C85AD731AF}" type="datetimeFigureOut">
               <a:rPr lang="en-US" smtClean="0"/>
-              <a:t>10/11/23</a:t>
+              <a:t>10/14/23</a:t>
             </a:fld>
             <a:endParaRPr lang="en-US" dirty="0"/>
           </a:p>
@@ -6830,7 +6830,7 @@
           <a:p>
             <a:fld id="{4AAD347D-5ACD-4C99-B74B-A9C85AD731AF}" type="datetimeFigureOut">
               <a:rPr lang="en-US" smtClean="0"/>
-              <a:t>10/11/23</a:t>
+              <a:t>10/14/23</a:t>
             </a:fld>
             <a:endParaRPr lang="en-US" dirty="0"/>
           </a:p>
@@ -7001,7 +7001,7 @@
           <a:p>
             <a:fld id="{4509A250-FF31-4206-8172-F9D3106AACB1}" type="datetimeFigureOut">
               <a:rPr lang="en-US" smtClean="0"/>
-              <a:t>10/11/23</a:t>
+              <a:t>10/14/23</a:t>
             </a:fld>
             <a:endParaRPr lang="en-US" dirty="0"/>
           </a:p>
@@ -7181,7 +7181,7 @@
           <a:p>
             <a:fld id="{4509A250-FF31-4206-8172-F9D3106AACB1}" type="datetimeFigureOut">
               <a:rPr lang="en-US" smtClean="0"/>
-              <a:t>10/11/23</a:t>
+              <a:t>10/14/23</a:t>
             </a:fld>
             <a:endParaRPr lang="en-US" dirty="0"/>
           </a:p>
@@ -7375,7 +7375,7 @@
           <a:p>
             <a:fld id="{4509A250-FF31-4206-8172-F9D3106AACB1}" type="datetimeFigureOut">
               <a:rPr lang="en-US" dirty="0"/>
-              <a:t>10/11/23</a:t>
+              <a:t>10/14/23</a:t>
             </a:fld>
             <a:endParaRPr lang="en-US" dirty="0"/>
           </a:p>
@@ -7545,7 +7545,7 @@
           <a:p>
             <a:fld id="{4509A250-FF31-4206-8172-F9D3106AACB1}" type="datetimeFigureOut">
               <a:rPr lang="en-US" smtClean="0"/>
-              <a:t>10/11/23</a:t>
+              <a:t>10/14/23</a:t>
             </a:fld>
             <a:endParaRPr lang="en-US" dirty="0"/>
           </a:p>
@@ -7795,7 +7795,7 @@
           <a:p>
             <a:fld id="{9796027F-7875-4030-9381-8BD8C4F21935}" type="datetimeFigureOut">
               <a:rPr lang="en-US" smtClean="0"/>
-              <a:t>10/11/23</a:t>
+              <a:t>10/14/23</a:t>
             </a:fld>
             <a:endParaRPr lang="en-US" dirty="0"/>
           </a:p>
@@ -8027,7 +8027,7 @@
           <a:p>
             <a:fld id="{9796027F-7875-4030-9381-8BD8C4F21935}" type="datetimeFigureOut">
               <a:rPr lang="en-US" smtClean="0"/>
-              <a:t>10/11/23</a:t>
+              <a:t>10/14/23</a:t>
             </a:fld>
             <a:endParaRPr lang="en-US" dirty="0"/>
           </a:p>
@@ -8408,7 +8408,7 @@
           <a:p>
             <a:fld id="{9796027F-7875-4030-9381-8BD8C4F21935}" type="datetimeFigureOut">
               <a:rPr lang="en-US" smtClean="0"/>
-              <a:t>10/11/23</a:t>
+              <a:t>10/14/23</a:t>
             </a:fld>
             <a:endParaRPr lang="en-US" dirty="0"/>
           </a:p>
@@ -8526,7 +8526,7 @@
           <a:p>
             <a:fld id="{4509A250-FF31-4206-8172-F9D3106AACB1}" type="datetimeFigureOut">
               <a:rPr lang="en-US" smtClean="0"/>
-              <a:t>10/11/23</a:t>
+              <a:t>10/14/23</a:t>
             </a:fld>
             <a:endParaRPr lang="en-US" dirty="0"/>
           </a:p>
@@ -8621,7 +8621,7 @@
           <a:p>
             <a:fld id="{4509A250-FF31-4206-8172-F9D3106AACB1}" type="datetimeFigureOut">
               <a:rPr lang="en-US" smtClean="0"/>
-              <a:t>10/11/23</a:t>
+              <a:t>10/14/23</a:t>
             </a:fld>
             <a:endParaRPr lang="en-US" dirty="0"/>
           </a:p>
@@ -8870,7 +8870,7 @@
           <a:p>
             <a:fld id="{4509A250-FF31-4206-8172-F9D3106AACB1}" type="datetimeFigureOut">
               <a:rPr lang="en-US" smtClean="0"/>
-              <a:t>10/11/23</a:t>
+              <a:t>10/14/23</a:t>
             </a:fld>
             <a:endParaRPr lang="en-US" dirty="0"/>
           </a:p>
@@ -9150,7 +9150,7 @@
           <a:p>
             <a:fld id="{4509A250-FF31-4206-8172-F9D3106AACB1}" type="datetimeFigureOut">
               <a:rPr lang="en-US" smtClean="0"/>
-              <a:t>10/11/23</a:t>
+              <a:t>10/14/23</a:t>
             </a:fld>
             <a:endParaRPr lang="en-US" dirty="0"/>
           </a:p>
@@ -9273,7 +9273,7 @@
           <a:noFill/>
           <a:extLst>
             <a:ext uri="{909E8E84-426E-40dd-AFC4-6F175D3DCCD1}">
-              <a14:hiddenFill xmlns="" xmlns:a14="http://schemas.microsoft.com/office/drawing/2010/main">
+              <a14:hiddenFill xmlns:a14="http://schemas.microsoft.com/office/drawing/2010/main" xmlns="">
                 <a:solidFill>
                   <a:srgbClr val="FFFFFF"/>
                 </a:solidFill>
@@ -9347,7 +9347,7 @@
               </a:ln>
               <a:extLst>
                 <a:ext uri="{91240B29-F687-4f45-9708-019B960494DF}">
-                  <a14:hiddenLine xmlns="" xmlns:a14="http://schemas.microsoft.com/office/drawing/2010/main" w="9525">
+                  <a14:hiddenLine xmlns:a14="http://schemas.microsoft.com/office/drawing/2010/main" xmlns="" w="9525">
                     <a:solidFill>
                       <a:srgbClr val="000000"/>
                     </a:solidFill>
@@ -9437,7 +9437,7 @@
               </a:ln>
               <a:extLst>
                 <a:ext uri="{91240B29-F687-4f45-9708-019B960494DF}">
-                  <a14:hiddenLine xmlns="" xmlns:a14="http://schemas.microsoft.com/office/drawing/2010/main" w="9525">
+                  <a14:hiddenLine xmlns:a14="http://schemas.microsoft.com/office/drawing/2010/main" xmlns="" w="9525">
                     <a:solidFill>
                       <a:srgbClr val="000000"/>
                     </a:solidFill>
@@ -9527,7 +9527,7 @@
               </a:ln>
               <a:extLst>
                 <a:ext uri="{91240B29-F687-4f45-9708-019B960494DF}">
-                  <a14:hiddenLine xmlns="" xmlns:a14="http://schemas.microsoft.com/office/drawing/2010/main" w="9525">
+                  <a14:hiddenLine xmlns:a14="http://schemas.microsoft.com/office/drawing/2010/main" xmlns="" w="9525">
                     <a:solidFill>
                       <a:srgbClr val="000000"/>
                     </a:solidFill>
@@ -9589,7 +9589,7 @@
               </a:ln>
               <a:extLst>
                 <a:ext uri="{91240B29-F687-4f45-9708-019B960494DF}">
-                  <a14:hiddenLine xmlns="" xmlns:a14="http://schemas.microsoft.com/office/drawing/2010/main" w="9525">
+                  <a14:hiddenLine xmlns:a14="http://schemas.microsoft.com/office/drawing/2010/main" xmlns="" w="9525">
                     <a:solidFill>
                       <a:srgbClr val="000000"/>
                     </a:solidFill>
@@ -9679,7 +9679,7 @@
               </a:ln>
               <a:extLst>
                 <a:ext uri="{91240B29-F687-4f45-9708-019B960494DF}">
-                  <a14:hiddenLine xmlns="" xmlns:a14="http://schemas.microsoft.com/office/drawing/2010/main" w="9525">
+                  <a14:hiddenLine xmlns:a14="http://schemas.microsoft.com/office/drawing/2010/main" xmlns="" w="9525">
                     <a:solidFill>
                       <a:srgbClr val="000000"/>
                     </a:solidFill>
@@ -9741,7 +9741,7 @@
               </a:ln>
               <a:extLst>
                 <a:ext uri="{91240B29-F687-4f45-9708-019B960494DF}">
-                  <a14:hiddenLine xmlns="" xmlns:a14="http://schemas.microsoft.com/office/drawing/2010/main" w="9525">
+                  <a14:hiddenLine xmlns:a14="http://schemas.microsoft.com/office/drawing/2010/main" xmlns="" w="9525">
                     <a:solidFill>
                       <a:srgbClr val="000000"/>
                     </a:solidFill>
@@ -9803,7 +9803,7 @@
               </a:ln>
               <a:extLst>
                 <a:ext uri="{91240B29-F687-4f45-9708-019B960494DF}">
-                  <a14:hiddenLine xmlns="" xmlns:a14="http://schemas.microsoft.com/office/drawing/2010/main" w="9525">
+                  <a14:hiddenLine xmlns:a14="http://schemas.microsoft.com/office/drawing/2010/main" xmlns="" w="9525">
                     <a:solidFill>
                       <a:srgbClr val="000000"/>
                     </a:solidFill>
@@ -9893,7 +9893,7 @@
               </a:ln>
               <a:extLst>
                 <a:ext uri="{91240B29-F687-4f45-9708-019B960494DF}">
-                  <a14:hiddenLine xmlns="" xmlns:a14="http://schemas.microsoft.com/office/drawing/2010/main" w="9525">
+                  <a14:hiddenLine xmlns:a14="http://schemas.microsoft.com/office/drawing/2010/main" xmlns="" w="9525">
                     <a:solidFill>
                       <a:srgbClr val="000000"/>
                     </a:solidFill>
@@ -9983,7 +9983,7 @@
               </a:ln>
               <a:extLst>
                 <a:ext uri="{91240B29-F687-4f45-9708-019B960494DF}">
-                  <a14:hiddenLine xmlns="" xmlns:a14="http://schemas.microsoft.com/office/drawing/2010/main" w="9525">
+                  <a14:hiddenLine xmlns:a14="http://schemas.microsoft.com/office/drawing/2010/main" xmlns="" w="9525">
                     <a:solidFill>
                       <a:srgbClr val="000000"/>
                     </a:solidFill>
@@ -10045,7 +10045,7 @@
               </a:ln>
               <a:extLst>
                 <a:ext uri="{91240B29-F687-4f45-9708-019B960494DF}">
-                  <a14:hiddenLine xmlns="" xmlns:a14="http://schemas.microsoft.com/office/drawing/2010/main" w="9525">
+                  <a14:hiddenLine xmlns:a14="http://schemas.microsoft.com/office/drawing/2010/main" xmlns="" w="9525">
                     <a:solidFill>
                       <a:srgbClr val="000000"/>
                     </a:solidFill>
@@ -10155,7 +10155,7 @@
               </a:ln>
               <a:extLst>
                 <a:ext uri="{91240B29-F687-4f45-9708-019B960494DF}">
-                  <a14:hiddenLine xmlns="" xmlns:a14="http://schemas.microsoft.com/office/drawing/2010/main" w="9525">
+                  <a14:hiddenLine xmlns:a14="http://schemas.microsoft.com/office/drawing/2010/main" xmlns="" w="9525">
                     <a:solidFill>
                       <a:srgbClr val="000000"/>
                     </a:solidFill>
@@ -10239,7 +10239,7 @@
               </a:ln>
               <a:extLst>
                 <a:ext uri="{91240B29-F687-4f45-9708-019B960494DF}">
-                  <a14:hiddenLine xmlns="" xmlns:a14="http://schemas.microsoft.com/office/drawing/2010/main" w="9525">
+                  <a14:hiddenLine xmlns:a14="http://schemas.microsoft.com/office/drawing/2010/main" xmlns="" w="9525">
                     <a:solidFill>
                       <a:srgbClr val="000000"/>
                     </a:solidFill>
@@ -10301,7 +10301,7 @@
               </a:ln>
               <a:extLst>
                 <a:ext uri="{91240B29-F687-4f45-9708-019B960494DF}">
-                  <a14:hiddenLine xmlns="" xmlns:a14="http://schemas.microsoft.com/office/drawing/2010/main" w="9525">
+                  <a14:hiddenLine xmlns:a14="http://schemas.microsoft.com/office/drawing/2010/main" xmlns="" w="9525">
                     <a:solidFill>
                       <a:srgbClr val="000000"/>
                     </a:solidFill>
@@ -10363,7 +10363,7 @@
               </a:ln>
               <a:extLst>
                 <a:ext uri="{91240B29-F687-4f45-9708-019B960494DF}">
-                  <a14:hiddenLine xmlns="" xmlns:a14="http://schemas.microsoft.com/office/drawing/2010/main" w="9525">
+                  <a14:hiddenLine xmlns:a14="http://schemas.microsoft.com/office/drawing/2010/main" xmlns="" w="9525">
                     <a:solidFill>
                       <a:srgbClr val="000000"/>
                     </a:solidFill>
@@ -10453,7 +10453,7 @@
               </a:ln>
               <a:extLst>
                 <a:ext uri="{91240B29-F687-4f45-9708-019B960494DF}">
-                  <a14:hiddenLine xmlns="" xmlns:a14="http://schemas.microsoft.com/office/drawing/2010/main" w="9525">
+                  <a14:hiddenLine xmlns:a14="http://schemas.microsoft.com/office/drawing/2010/main" xmlns="" w="9525">
                     <a:solidFill>
                       <a:srgbClr val="000000"/>
                     </a:solidFill>
@@ -10487,7 +10487,7 @@
               </a:ln>
               <a:extLst>
                 <a:ext uri="{91240B29-F687-4f45-9708-019B960494DF}">
-                  <a14:hiddenLine xmlns="" xmlns:a14="http://schemas.microsoft.com/office/drawing/2010/main" w="9525">
+                  <a14:hiddenLine xmlns:a14="http://schemas.microsoft.com/office/drawing/2010/main" xmlns="" w="9525">
                     <a:solidFill>
                       <a:srgbClr val="000000"/>
                     </a:solidFill>
@@ -10552,7 +10552,7 @@
               </a:ln>
               <a:extLst>
                 <a:ext uri="{91240B29-F687-4f45-9708-019B960494DF}">
-                  <a14:hiddenLine xmlns="" xmlns:a14="http://schemas.microsoft.com/office/drawing/2010/main" w="9525">
+                  <a14:hiddenLine xmlns:a14="http://schemas.microsoft.com/office/drawing/2010/main" xmlns="" w="9525">
                     <a:solidFill>
                       <a:srgbClr val="000000"/>
                     </a:solidFill>
@@ -10642,7 +10642,7 @@
               </a:ln>
               <a:extLst>
                 <a:ext uri="{91240B29-F687-4f45-9708-019B960494DF}">
-                  <a14:hiddenLine xmlns="" xmlns:a14="http://schemas.microsoft.com/office/drawing/2010/main" w="9525">
+                  <a14:hiddenLine xmlns:a14="http://schemas.microsoft.com/office/drawing/2010/main" xmlns="" w="9525">
                     <a:solidFill>
                       <a:srgbClr val="000000"/>
                     </a:solidFill>
@@ -10704,7 +10704,7 @@
               </a:ln>
               <a:extLst>
                 <a:ext uri="{91240B29-F687-4f45-9708-019B960494DF}">
-                  <a14:hiddenLine xmlns="" xmlns:a14="http://schemas.microsoft.com/office/drawing/2010/main" w="9525">
+                  <a14:hiddenLine xmlns:a14="http://schemas.microsoft.com/office/drawing/2010/main" xmlns="" w="9525">
                     <a:solidFill>
                       <a:srgbClr val="000000"/>
                     </a:solidFill>
@@ -10794,7 +10794,7 @@
               </a:ln>
               <a:extLst>
                 <a:ext uri="{91240B29-F687-4f45-9708-019B960494DF}">
-                  <a14:hiddenLine xmlns="" xmlns:a14="http://schemas.microsoft.com/office/drawing/2010/main" w="9525">
+                  <a14:hiddenLine xmlns:a14="http://schemas.microsoft.com/office/drawing/2010/main" xmlns="" w="9525">
                     <a:solidFill>
                       <a:srgbClr val="000000"/>
                     </a:solidFill>
@@ -10859,7 +10859,7 @@
               </a:ln>
               <a:extLst>
                 <a:ext uri="{91240B29-F687-4f45-9708-019B960494DF}">
-                  <a14:hiddenLine xmlns="" xmlns:a14="http://schemas.microsoft.com/office/drawing/2010/main" w="9525">
+                  <a14:hiddenLine xmlns:a14="http://schemas.microsoft.com/office/drawing/2010/main" xmlns="" w="9525">
                     <a:solidFill>
                       <a:srgbClr val="000000"/>
                     </a:solidFill>
@@ -10921,7 +10921,7 @@
               </a:ln>
               <a:extLst>
                 <a:ext uri="{91240B29-F687-4f45-9708-019B960494DF}">
-                  <a14:hiddenLine xmlns="" xmlns:a14="http://schemas.microsoft.com/office/drawing/2010/main" w="9525">
+                  <a14:hiddenLine xmlns:a14="http://schemas.microsoft.com/office/drawing/2010/main" xmlns="" w="9525">
                     <a:solidFill>
                       <a:srgbClr val="000000"/>
                     </a:solidFill>
@@ -11011,7 +11011,7 @@
               </a:ln>
               <a:extLst>
                 <a:ext uri="{91240B29-F687-4f45-9708-019B960494DF}">
-                  <a14:hiddenLine xmlns="" xmlns:a14="http://schemas.microsoft.com/office/drawing/2010/main" w="9525">
+                  <a14:hiddenLine xmlns:a14="http://schemas.microsoft.com/office/drawing/2010/main" xmlns="" w="9525">
                     <a:solidFill>
                       <a:srgbClr val="000000"/>
                     </a:solidFill>
@@ -11101,7 +11101,7 @@
               </a:ln>
               <a:extLst>
                 <a:ext uri="{91240B29-F687-4f45-9708-019B960494DF}">
-                  <a14:hiddenLine xmlns="" xmlns:a14="http://schemas.microsoft.com/office/drawing/2010/main" w="9525">
+                  <a14:hiddenLine xmlns:a14="http://schemas.microsoft.com/office/drawing/2010/main" xmlns="" w="9525">
                     <a:solidFill>
                       <a:srgbClr val="000000"/>
                     </a:solidFill>
@@ -11166,7 +11166,7 @@
               </a:ln>
               <a:extLst>
                 <a:ext uri="{91240B29-F687-4f45-9708-019B960494DF}">
-                  <a14:hiddenLine xmlns="" xmlns:a14="http://schemas.microsoft.com/office/drawing/2010/main" w="9525">
+                  <a14:hiddenLine xmlns:a14="http://schemas.microsoft.com/office/drawing/2010/main" xmlns="" w="9525">
                     <a:solidFill>
                       <a:srgbClr val="000000"/>
                     </a:solidFill>
@@ -11286,7 +11286,7 @@
               </a:ln>
               <a:extLst>
                 <a:ext uri="{91240B29-F687-4f45-9708-019B960494DF}">
-                  <a14:hiddenLine xmlns="" xmlns:a14="http://schemas.microsoft.com/office/drawing/2010/main" w="9525">
+                  <a14:hiddenLine xmlns:a14="http://schemas.microsoft.com/office/drawing/2010/main" xmlns="" w="9525">
                     <a:solidFill>
                       <a:srgbClr val="000000"/>
                     </a:solidFill>
@@ -11367,7 +11367,7 @@
               </a:ln>
               <a:extLst>
                 <a:ext uri="{91240B29-F687-4f45-9708-019B960494DF}">
-                  <a14:hiddenLine xmlns="" xmlns:a14="http://schemas.microsoft.com/office/drawing/2010/main" w="9525">
+                  <a14:hiddenLine xmlns:a14="http://schemas.microsoft.com/office/drawing/2010/main" xmlns="" w="9525">
                     <a:solidFill>
                       <a:srgbClr val="000000"/>
                     </a:solidFill>
@@ -11482,7 +11482,7 @@
               </a:ln>
               <a:extLst>
                 <a:ext uri="{91240B29-F687-4f45-9708-019B960494DF}">
-                  <a14:hiddenLine xmlns="" xmlns:a14="http://schemas.microsoft.com/office/drawing/2010/main" w="9525">
+                  <a14:hiddenLine xmlns:a14="http://schemas.microsoft.com/office/drawing/2010/main" xmlns="" w="9525">
                     <a:solidFill>
                       <a:srgbClr val="000000"/>
                     </a:solidFill>
@@ -11572,7 +11572,7 @@
               </a:ln>
               <a:extLst>
                 <a:ext uri="{91240B29-F687-4f45-9708-019B960494DF}">
-                  <a14:hiddenLine xmlns="" xmlns:a14="http://schemas.microsoft.com/office/drawing/2010/main" w="9525">
+                  <a14:hiddenLine xmlns:a14="http://schemas.microsoft.com/office/drawing/2010/main" xmlns="" w="9525">
                     <a:solidFill>
                       <a:srgbClr val="000000"/>
                     </a:solidFill>
@@ -11637,7 +11637,7 @@
               </a:ln>
               <a:extLst>
                 <a:ext uri="{91240B29-F687-4f45-9708-019B960494DF}">
-                  <a14:hiddenLine xmlns="" xmlns:a14="http://schemas.microsoft.com/office/drawing/2010/main" w="9525">
+                  <a14:hiddenLine xmlns:a14="http://schemas.microsoft.com/office/drawing/2010/main" xmlns="" w="9525">
                     <a:solidFill>
                       <a:srgbClr val="000000"/>
                     </a:solidFill>
@@ -11727,7 +11727,7 @@
               </a:ln>
               <a:extLst>
                 <a:ext uri="{91240B29-F687-4f45-9708-019B960494DF}">
-                  <a14:hiddenLine xmlns="" xmlns:a14="http://schemas.microsoft.com/office/drawing/2010/main" w="9525">
+                  <a14:hiddenLine xmlns:a14="http://schemas.microsoft.com/office/drawing/2010/main" xmlns="" w="9525">
                     <a:solidFill>
                       <a:srgbClr val="000000"/>
                     </a:solidFill>
@@ -11795,7 +11795,7 @@
               </a:ln>
               <a:extLst>
                 <a:ext uri="{91240B29-F687-4f45-9708-019B960494DF}">
-                  <a14:hiddenLine xmlns="" xmlns:a14="http://schemas.microsoft.com/office/drawing/2010/main" w="9525">
+                  <a14:hiddenLine xmlns:a14="http://schemas.microsoft.com/office/drawing/2010/main" xmlns="" w="9525">
                     <a:solidFill>
                       <a:srgbClr val="000000"/>
                     </a:solidFill>
@@ -11885,7 +11885,7 @@
               </a:ln>
               <a:extLst>
                 <a:ext uri="{91240B29-F687-4f45-9708-019B960494DF}">
-                  <a14:hiddenLine xmlns="" xmlns:a14="http://schemas.microsoft.com/office/drawing/2010/main" w="9525">
+                  <a14:hiddenLine xmlns:a14="http://schemas.microsoft.com/office/drawing/2010/main" xmlns="" w="9525">
                     <a:solidFill>
                       <a:srgbClr val="000000"/>
                     </a:solidFill>
@@ -11953,7 +11953,7 @@
               </a:ln>
               <a:extLst>
                 <a:ext uri="{91240B29-F687-4f45-9708-019B960494DF}">
-                  <a14:hiddenLine xmlns="" xmlns:a14="http://schemas.microsoft.com/office/drawing/2010/main" w="9525">
+                  <a14:hiddenLine xmlns:a14="http://schemas.microsoft.com/office/drawing/2010/main" xmlns="" w="9525">
                     <a:solidFill>
                       <a:srgbClr val="000000"/>
                     </a:solidFill>
@@ -12043,7 +12043,7 @@
               </a:ln>
               <a:extLst>
                 <a:ext uri="{91240B29-F687-4f45-9708-019B960494DF}">
-                  <a14:hiddenLine xmlns="" xmlns:a14="http://schemas.microsoft.com/office/drawing/2010/main" w="9525">
+                  <a14:hiddenLine xmlns:a14="http://schemas.microsoft.com/office/drawing/2010/main" xmlns="" w="9525">
                     <a:solidFill>
                       <a:srgbClr val="000000"/>
                     </a:solidFill>
@@ -12077,7 +12077,7 @@
               </a:ln>
               <a:extLst>
                 <a:ext uri="{91240B29-F687-4f45-9708-019B960494DF}">
-                  <a14:hiddenLine xmlns="" xmlns:a14="http://schemas.microsoft.com/office/drawing/2010/main" w="9525">
+                  <a14:hiddenLine xmlns:a14="http://schemas.microsoft.com/office/drawing/2010/main" xmlns="" w="9525">
                     <a:solidFill>
                       <a:srgbClr val="000000"/>
                     </a:solidFill>
@@ -12217,7 +12217,7 @@
           <a:p>
             <a:fld id="{4AAD347D-5ACD-4C99-B74B-A9C85AD731AF}" type="datetimeFigureOut">
               <a:rPr lang="en-US" smtClean="0"/>
-              <a:t>10/11/23</a:t>
+              <a:t>10/14/23</a:t>
             </a:fld>
             <a:endParaRPr lang="en-US" dirty="0"/>
           </a:p>
@@ -12810,25 +12810,16 @@
           </a:p>
           <a:p>
             <a:r>
+              <a:rPr lang="es-MX"/>
+              <a:t>Vinisa </a:t>
+            </a:r>
+            <a:r>
               <a:rPr lang="es-MX" dirty="0"/>
-              <a:t>Charly Moo - </a:t>
+              <a:t>Citlalli Hernández Basilio - </a:t>
             </a:r>
             <a:r>
               <a:rPr lang="es-MX" dirty="0">
                 <a:hlinkClick r:id="rId4"/>
-              </a:rPr>
-              <a:t>charlymooayala@gmail.com</a:t>
-            </a:r>
-            <a:endParaRPr lang="es-MX" dirty="0"/>
-          </a:p>
-          <a:p>
-            <a:r>
-              <a:rPr lang="es-MX" dirty="0"/>
-              <a:t>Vinisa Citlalli Hernández Basilio - </a:t>
-            </a:r>
-            <a:r>
-              <a:rPr lang="es-MX" dirty="0">
-                <a:hlinkClick r:id="rId5"/>
               </a:rPr>
               <a:t>citlallihernandezbasilio@gmail.com</a:t>
             </a:r>
@@ -12892,28 +12883,17 @@
           <a:p>
             <a:r>
               <a:rPr lang="es-MX" dirty="0"/>
-              <a:t>Enlace de app en (deployment)…</a:t>
+              <a:t>ENLACE de despliegue</a:t>
             </a:r>
+            <a:br>
+              <a:rPr lang="es-MX" dirty="0"/>
+            </a:br>
+            <a:r>
+              <a:rPr lang="es-MX" dirty="0"/>
+              <a:t>en azure</a:t>
+            </a:r>
           </a:p>
         </p:txBody>
-      </p:sp>
-      <p:sp>
-        <p:nvSpPr>
-          <p:cNvPr id="7" name="Marcador de posición de imagen 6">
-            <a:extLst>
-              <a:ext uri="{FF2B5EF4-FFF2-40B4-BE49-F238E27FC236}">
-                <a16:creationId xmlns:a16="http://schemas.microsoft.com/office/drawing/2014/main" id="{98884498-2E83-8D42-B10D-024BCBF48678}"/>
-              </a:ext>
-            </a:extLst>
-          </p:cNvPr>
-          <p:cNvSpPr>
-            <a:spLocks noGrp="1"/>
-          </p:cNvSpPr>
-          <p:nvPr>
-            <p:ph type="pic" idx="1"/>
-          </p:nvPr>
-        </p:nvSpPr>
-        <p:spPr/>
       </p:sp>
       <p:sp>
         <p:nvSpPr>
@@ -12940,18 +12920,76 @@
               <a:rPr lang="es-MX" dirty="0">
                 <a:hlinkClick r:id="rId2"/>
               </a:rPr>
-              <a:t>Https://servidor</a:t>
+              <a:t>http://20.84.146.46:8080/</a:t>
             </a:r>
             <a:endParaRPr lang="es-MX" dirty="0"/>
           </a:p>
-          <a:p>
-            <a:r>
-              <a:rPr lang="es-MX" dirty="0"/>
-              <a:t>Icono de proveedor de servidor y qr a la derecha</a:t>
-            </a:r>
-          </a:p>
         </p:txBody>
       </p:sp>
+      <p:pic>
+        <p:nvPicPr>
+          <p:cNvPr id="11" name="Marcador de posición de imagen 12">
+            <a:extLst>
+              <a:ext uri="{FF2B5EF4-FFF2-40B4-BE49-F238E27FC236}">
+                <a16:creationId xmlns:a16="http://schemas.microsoft.com/office/drawing/2014/main" id="{BC030736-3B83-4342-9E8F-2B6C002B37EB}"/>
+              </a:ext>
+            </a:extLst>
+          </p:cNvPr>
+          <p:cNvPicPr>
+            <a:picLocks noGrp="1" noChangeAspect="1"/>
+          </p:cNvPicPr>
+          <p:nvPr>
+            <p:ph type="pic" idx="1"/>
+          </p:nvPr>
+        </p:nvPicPr>
+        <p:blipFill>
+          <a:blip r:embed="rId3"/>
+          <a:srcRect l="2221" r="2221"/>
+          <a:stretch>
+            <a:fillRect/>
+          </a:stretch>
+        </p:blipFill>
+        <p:spPr>
+          <a:xfrm>
+            <a:off x="6489539" y="724693"/>
+            <a:ext cx="4951413" cy="4951413"/>
+          </a:xfrm>
+          <a:noFill/>
+          <a:ln>
+            <a:noFill/>
+          </a:ln>
+        </p:spPr>
+      </p:pic>
+      <p:pic>
+        <p:nvPicPr>
+          <p:cNvPr id="12" name="Imagen 11">
+            <a:extLst>
+              <a:ext uri="{FF2B5EF4-FFF2-40B4-BE49-F238E27FC236}">
+                <a16:creationId xmlns:a16="http://schemas.microsoft.com/office/drawing/2014/main" id="{4638C352-8009-3043-A227-41544407ADF7}"/>
+              </a:ext>
+            </a:extLst>
+          </p:cNvPr>
+          <p:cNvPicPr>
+            <a:picLocks noChangeAspect="1"/>
+          </p:cNvPicPr>
+          <p:nvPr/>
+        </p:nvPicPr>
+        <p:blipFill>
+          <a:blip r:embed="rId4"/>
+          <a:stretch>
+            <a:fillRect/>
+          </a:stretch>
+        </p:blipFill>
+        <p:spPr>
+          <a:xfrm>
+            <a:off x="4194172" y="3889372"/>
+            <a:ext cx="1901828" cy="1901828"/>
+          </a:xfrm>
+          <a:prstGeom prst="rect">
+            <a:avLst/>
+          </a:prstGeom>
+        </p:spPr>
+      </p:pic>
     </p:spTree>
     <p:extLst>
       <p:ext uri="{BB962C8B-B14F-4D97-AF65-F5344CB8AC3E}">

</xml_diff>

<commit_message>
Ya todo funciona (creo) 😴
</commit_message>
<xml_diff>
--- a/requerimentos/Planificación.pptx
+++ b/requerimentos/Planificación.pptx
@@ -175,7 +175,7 @@
           <a:noFill/>
           <a:extLst>
             <a:ext uri="{909E8E84-426E-40dd-AFC4-6F175D3DCCD1}">
-              <a14:hiddenFill xmlns:a14="http://schemas.microsoft.com/office/drawing/2010/main" xmlns="">
+              <a14:hiddenFill xmlns="" xmlns:a14="http://schemas.microsoft.com/office/drawing/2010/main">
                 <a:solidFill>
                   <a:srgbClr val="FFFFFF"/>
                 </a:solidFill>
@@ -234,7 +234,7 @@
             </a:ln>
             <a:extLst>
               <a:ext uri="{91240B29-F687-4f45-9708-019B960494DF}">
-                <a14:hiddenLine xmlns:a14="http://schemas.microsoft.com/office/drawing/2010/main" xmlns="" w="9525">
+                <a14:hiddenLine xmlns="" xmlns:a14="http://schemas.microsoft.com/office/drawing/2010/main" w="9525">
                   <a:solidFill>
                     <a:srgbClr val="000000"/>
                   </a:solidFill>
@@ -324,7 +324,7 @@
             </a:ln>
             <a:extLst>
               <a:ext uri="{91240B29-F687-4f45-9708-019B960494DF}">
-                <a14:hiddenLine xmlns:a14="http://schemas.microsoft.com/office/drawing/2010/main" xmlns="" w="9525">
+                <a14:hiddenLine xmlns="" xmlns:a14="http://schemas.microsoft.com/office/drawing/2010/main" w="9525">
                   <a:solidFill>
                     <a:srgbClr val="000000"/>
                   </a:solidFill>
@@ -414,7 +414,7 @@
             </a:ln>
             <a:extLst>
               <a:ext uri="{91240B29-F687-4f45-9708-019B960494DF}">
-                <a14:hiddenLine xmlns:a14="http://schemas.microsoft.com/office/drawing/2010/main" xmlns="" w="9525">
+                <a14:hiddenLine xmlns="" xmlns:a14="http://schemas.microsoft.com/office/drawing/2010/main" w="9525">
                   <a:solidFill>
                     <a:srgbClr val="000000"/>
                   </a:solidFill>
@@ -448,7 +448,7 @@
             </a:ln>
             <a:extLst>
               <a:ext uri="{91240B29-F687-4f45-9708-019B960494DF}">
-                <a14:hiddenLine xmlns:a14="http://schemas.microsoft.com/office/drawing/2010/main" xmlns="" w="9525">
+                <a14:hiddenLine xmlns="" xmlns:a14="http://schemas.microsoft.com/office/drawing/2010/main" w="9525">
                   <a:solidFill>
                     <a:srgbClr val="000000"/>
                   </a:solidFill>
@@ -538,7 +538,7 @@
             </a:ln>
             <a:extLst>
               <a:ext uri="{91240B29-F687-4f45-9708-019B960494DF}">
-                <a14:hiddenLine xmlns:a14="http://schemas.microsoft.com/office/drawing/2010/main" xmlns="" w="9525">
+                <a14:hiddenLine xmlns="" xmlns:a14="http://schemas.microsoft.com/office/drawing/2010/main" w="9525">
                   <a:solidFill>
                     <a:srgbClr val="000000"/>
                   </a:solidFill>
@@ -600,7 +600,7 @@
             </a:ln>
             <a:extLst>
               <a:ext uri="{91240B29-F687-4f45-9708-019B960494DF}">
-                <a14:hiddenLine xmlns:a14="http://schemas.microsoft.com/office/drawing/2010/main" xmlns="" w="9525">
+                <a14:hiddenLine xmlns="" xmlns:a14="http://schemas.microsoft.com/office/drawing/2010/main" w="9525">
                   <a:solidFill>
                     <a:srgbClr val="000000"/>
                   </a:solidFill>
@@ -662,7 +662,7 @@
             </a:ln>
             <a:extLst>
               <a:ext uri="{91240B29-F687-4f45-9708-019B960494DF}">
-                <a14:hiddenLine xmlns:a14="http://schemas.microsoft.com/office/drawing/2010/main" xmlns="" w="9525">
+                <a14:hiddenLine xmlns="" xmlns:a14="http://schemas.microsoft.com/office/drawing/2010/main" w="9525">
                   <a:solidFill>
                     <a:srgbClr val="000000"/>
                   </a:solidFill>
@@ -752,7 +752,7 @@
             </a:ln>
             <a:extLst>
               <a:ext uri="{91240B29-F687-4f45-9708-019B960494DF}">
-                <a14:hiddenLine xmlns:a14="http://schemas.microsoft.com/office/drawing/2010/main" xmlns="" w="9525">
+                <a14:hiddenLine xmlns="" xmlns:a14="http://schemas.microsoft.com/office/drawing/2010/main" w="9525">
                   <a:solidFill>
                     <a:srgbClr val="000000"/>
                   </a:solidFill>
@@ -814,7 +814,7 @@
             </a:ln>
             <a:extLst>
               <a:ext uri="{91240B29-F687-4f45-9708-019B960494DF}">
-                <a14:hiddenLine xmlns:a14="http://schemas.microsoft.com/office/drawing/2010/main" xmlns="" w="9525">
+                <a14:hiddenLine xmlns="" xmlns:a14="http://schemas.microsoft.com/office/drawing/2010/main" w="9525">
                   <a:solidFill>
                     <a:srgbClr val="000000"/>
                   </a:solidFill>
@@ -876,7 +876,7 @@
             </a:ln>
             <a:extLst>
               <a:ext uri="{91240B29-F687-4f45-9708-019B960494DF}">
-                <a14:hiddenLine xmlns:a14="http://schemas.microsoft.com/office/drawing/2010/main" xmlns="" w="9525">
+                <a14:hiddenLine xmlns="" xmlns:a14="http://schemas.microsoft.com/office/drawing/2010/main" w="9525">
                   <a:solidFill>
                     <a:srgbClr val="000000"/>
                   </a:solidFill>
@@ -966,7 +966,7 @@
             </a:ln>
             <a:extLst>
               <a:ext uri="{91240B29-F687-4f45-9708-019B960494DF}">
-                <a14:hiddenLine xmlns:a14="http://schemas.microsoft.com/office/drawing/2010/main" xmlns="" w="9525">
+                <a14:hiddenLine xmlns="" xmlns:a14="http://schemas.microsoft.com/office/drawing/2010/main" w="9525">
                   <a:solidFill>
                     <a:srgbClr val="000000"/>
                   </a:solidFill>
@@ -1056,7 +1056,7 @@
             </a:ln>
             <a:extLst>
               <a:ext uri="{91240B29-F687-4f45-9708-019B960494DF}">
-                <a14:hiddenLine xmlns:a14="http://schemas.microsoft.com/office/drawing/2010/main" xmlns="" w="9525">
+                <a14:hiddenLine xmlns="" xmlns:a14="http://schemas.microsoft.com/office/drawing/2010/main" w="9525">
                   <a:solidFill>
                     <a:srgbClr val="000000"/>
                   </a:solidFill>
@@ -1118,7 +1118,7 @@
             </a:ln>
             <a:extLst>
               <a:ext uri="{91240B29-F687-4f45-9708-019B960494DF}">
-                <a14:hiddenLine xmlns:a14="http://schemas.microsoft.com/office/drawing/2010/main" xmlns="" w="9525">
+                <a14:hiddenLine xmlns="" xmlns:a14="http://schemas.microsoft.com/office/drawing/2010/main" w="9525">
                   <a:solidFill>
                     <a:srgbClr val="000000"/>
                   </a:solidFill>
@@ -1228,7 +1228,7 @@
             </a:ln>
             <a:extLst>
               <a:ext uri="{91240B29-F687-4f45-9708-019B960494DF}">
-                <a14:hiddenLine xmlns:a14="http://schemas.microsoft.com/office/drawing/2010/main" xmlns="" w="9525">
+                <a14:hiddenLine xmlns="" xmlns:a14="http://schemas.microsoft.com/office/drawing/2010/main" w="9525">
                   <a:solidFill>
                     <a:srgbClr val="000000"/>
                   </a:solidFill>
@@ -1290,7 +1290,7 @@
             </a:ln>
             <a:extLst>
               <a:ext uri="{91240B29-F687-4f45-9708-019B960494DF}">
-                <a14:hiddenLine xmlns:a14="http://schemas.microsoft.com/office/drawing/2010/main" xmlns="" w="9525">
+                <a14:hiddenLine xmlns="" xmlns:a14="http://schemas.microsoft.com/office/drawing/2010/main" w="9525">
                   <a:solidFill>
                     <a:srgbClr val="000000"/>
                   </a:solidFill>
@@ -1380,7 +1380,7 @@
             </a:ln>
             <a:extLst>
               <a:ext uri="{91240B29-F687-4f45-9708-019B960494DF}">
-                <a14:hiddenLine xmlns:a14="http://schemas.microsoft.com/office/drawing/2010/main" xmlns="" w="9525">
+                <a14:hiddenLine xmlns="" xmlns:a14="http://schemas.microsoft.com/office/drawing/2010/main" w="9525">
                   <a:solidFill>
                     <a:srgbClr val="000000"/>
                   </a:solidFill>
@@ -1470,7 +1470,7 @@
             </a:ln>
             <a:extLst>
               <a:ext uri="{91240B29-F687-4f45-9708-019B960494DF}">
-                <a14:hiddenLine xmlns:a14="http://schemas.microsoft.com/office/drawing/2010/main" xmlns="" w="9525">
+                <a14:hiddenLine xmlns="" xmlns:a14="http://schemas.microsoft.com/office/drawing/2010/main" w="9525">
                   <a:solidFill>
                     <a:srgbClr val="000000"/>
                   </a:solidFill>
@@ -1532,7 +1532,7 @@
             </a:ln>
             <a:extLst>
               <a:ext uri="{91240B29-F687-4f45-9708-019B960494DF}">
-                <a14:hiddenLine xmlns:a14="http://schemas.microsoft.com/office/drawing/2010/main" xmlns="" w="9525">
+                <a14:hiddenLine xmlns="" xmlns:a14="http://schemas.microsoft.com/office/drawing/2010/main" w="9525">
                   <a:solidFill>
                     <a:srgbClr val="000000"/>
                   </a:solidFill>
@@ -1622,7 +1622,7 @@
             </a:ln>
             <a:extLst>
               <a:ext uri="{91240B29-F687-4f45-9708-019B960494DF}">
-                <a14:hiddenLine xmlns:a14="http://schemas.microsoft.com/office/drawing/2010/main" xmlns="" w="9525">
+                <a14:hiddenLine xmlns="" xmlns:a14="http://schemas.microsoft.com/office/drawing/2010/main" w="9525">
                   <a:solidFill>
                     <a:srgbClr val="000000"/>
                   </a:solidFill>
@@ -1712,7 +1712,7 @@
             </a:ln>
             <a:extLst>
               <a:ext uri="{91240B29-F687-4f45-9708-019B960494DF}">
-                <a14:hiddenLine xmlns:a14="http://schemas.microsoft.com/office/drawing/2010/main" xmlns="" w="9525">
+                <a14:hiddenLine xmlns="" xmlns:a14="http://schemas.microsoft.com/office/drawing/2010/main" w="9525">
                   <a:solidFill>
                     <a:srgbClr val="000000"/>
                   </a:solidFill>
@@ -1768,7 +1768,7 @@
             </a:ln>
             <a:extLst>
               <a:ext uri="{91240B29-F687-4f45-9708-019B960494DF}">
-                <a14:hiddenLine xmlns:a14="http://schemas.microsoft.com/office/drawing/2010/main" xmlns="" w="9525">
+                <a14:hiddenLine xmlns="" xmlns:a14="http://schemas.microsoft.com/office/drawing/2010/main" w="9525">
                   <a:solidFill>
                     <a:srgbClr val="000000"/>
                   </a:solidFill>
@@ -1858,7 +1858,7 @@
             </a:ln>
             <a:extLst>
               <a:ext uri="{91240B29-F687-4f45-9708-019B960494DF}">
-                <a14:hiddenLine xmlns:a14="http://schemas.microsoft.com/office/drawing/2010/main" xmlns="" w="9525">
+                <a14:hiddenLine xmlns="" xmlns:a14="http://schemas.microsoft.com/office/drawing/2010/main" w="9525">
                   <a:solidFill>
                     <a:srgbClr val="000000"/>
                   </a:solidFill>
@@ -1914,7 +1914,7 @@
             </a:ln>
             <a:extLst>
               <a:ext uri="{91240B29-F687-4f45-9708-019B960494DF}">
-                <a14:hiddenLine xmlns:a14="http://schemas.microsoft.com/office/drawing/2010/main" xmlns="" w="9525">
+                <a14:hiddenLine xmlns="" xmlns:a14="http://schemas.microsoft.com/office/drawing/2010/main" w="9525">
                   <a:solidFill>
                     <a:srgbClr val="000000"/>
                   </a:solidFill>
@@ -2004,7 +2004,7 @@
             </a:ln>
             <a:extLst>
               <a:ext uri="{91240B29-F687-4f45-9708-019B960494DF}">
-                <a14:hiddenLine xmlns:a14="http://schemas.microsoft.com/office/drawing/2010/main" xmlns="" w="9525">
+                <a14:hiddenLine xmlns="" xmlns:a14="http://schemas.microsoft.com/office/drawing/2010/main" w="9525">
                   <a:solidFill>
                     <a:srgbClr val="000000"/>
                   </a:solidFill>
@@ -2072,7 +2072,7 @@
             </a:ln>
             <a:extLst>
               <a:ext uri="{91240B29-F687-4f45-9708-019B960494DF}">
-                <a14:hiddenLine xmlns:a14="http://schemas.microsoft.com/office/drawing/2010/main" xmlns="" w="9525">
+                <a14:hiddenLine xmlns="" xmlns:a14="http://schemas.microsoft.com/office/drawing/2010/main" w="9525">
                   <a:solidFill>
                     <a:srgbClr val="000000"/>
                   </a:solidFill>
@@ -2162,7 +2162,7 @@
             </a:ln>
             <a:extLst>
               <a:ext uri="{91240B29-F687-4f45-9708-019B960494DF}">
-                <a14:hiddenLine xmlns:a14="http://schemas.microsoft.com/office/drawing/2010/main" xmlns="" w="9525">
+                <a14:hiddenLine xmlns="" xmlns:a14="http://schemas.microsoft.com/office/drawing/2010/main" w="9525">
                   <a:solidFill>
                     <a:srgbClr val="000000"/>
                   </a:solidFill>
@@ -2230,7 +2230,7 @@
             </a:ln>
             <a:extLst>
               <a:ext uri="{91240B29-F687-4f45-9708-019B960494DF}">
-                <a14:hiddenLine xmlns:a14="http://schemas.microsoft.com/office/drawing/2010/main" xmlns="" w="9525">
+                <a14:hiddenLine xmlns="" xmlns:a14="http://schemas.microsoft.com/office/drawing/2010/main" w="9525">
                   <a:solidFill>
                     <a:srgbClr val="000000"/>
                   </a:solidFill>
@@ -2320,7 +2320,7 @@
             </a:ln>
             <a:extLst>
               <a:ext uri="{91240B29-F687-4f45-9708-019B960494DF}">
-                <a14:hiddenLine xmlns:a14="http://schemas.microsoft.com/office/drawing/2010/main" xmlns="" w="9525">
+                <a14:hiddenLine xmlns="" xmlns:a14="http://schemas.microsoft.com/office/drawing/2010/main" w="9525">
                   <a:solidFill>
                     <a:srgbClr val="000000"/>
                   </a:solidFill>
@@ -2354,7 +2354,7 @@
             </a:ln>
             <a:extLst>
               <a:ext uri="{91240B29-F687-4f45-9708-019B960494DF}">
-                <a14:hiddenLine xmlns:a14="http://schemas.microsoft.com/office/drawing/2010/main" xmlns="" w="9525">
+                <a14:hiddenLine xmlns="" xmlns:a14="http://schemas.microsoft.com/office/drawing/2010/main" w="9525">
                   <a:solidFill>
                     <a:srgbClr val="000000"/>
                   </a:solidFill>
@@ -2444,7 +2444,7 @@
             </a:ln>
             <a:extLst>
               <a:ext uri="{91240B29-F687-4f45-9708-019B960494DF}">
-                <a14:hiddenLine xmlns:a14="http://schemas.microsoft.com/office/drawing/2010/main" xmlns="" w="9525">
+                <a14:hiddenLine xmlns="" xmlns:a14="http://schemas.microsoft.com/office/drawing/2010/main" w="9525">
                   <a:solidFill>
                     <a:srgbClr val="000000"/>
                   </a:solidFill>
@@ -2506,7 +2506,7 @@
             </a:ln>
             <a:extLst>
               <a:ext uri="{91240B29-F687-4f45-9708-019B960494DF}">
-                <a14:hiddenLine xmlns:a14="http://schemas.microsoft.com/office/drawing/2010/main" xmlns="" w="9525">
+                <a14:hiddenLine xmlns="" xmlns:a14="http://schemas.microsoft.com/office/drawing/2010/main" w="9525">
                   <a:solidFill>
                     <a:srgbClr val="000000"/>
                   </a:solidFill>
@@ -2568,7 +2568,7 @@
             </a:ln>
             <a:extLst>
               <a:ext uri="{91240B29-F687-4f45-9708-019B960494DF}">
-                <a14:hiddenLine xmlns:a14="http://schemas.microsoft.com/office/drawing/2010/main" xmlns="" w="9525">
+                <a14:hiddenLine xmlns="" xmlns:a14="http://schemas.microsoft.com/office/drawing/2010/main" w="9525">
                   <a:solidFill>
                     <a:srgbClr val="000000"/>
                   </a:solidFill>
@@ -2658,7 +2658,7 @@
             </a:ln>
             <a:extLst>
               <a:ext uri="{91240B29-F687-4f45-9708-019B960494DF}">
-                <a14:hiddenLine xmlns:a14="http://schemas.microsoft.com/office/drawing/2010/main" xmlns="" w="9525">
+                <a14:hiddenLine xmlns="" xmlns:a14="http://schemas.microsoft.com/office/drawing/2010/main" w="9525">
                   <a:solidFill>
                     <a:srgbClr val="000000"/>
                   </a:solidFill>
@@ -2726,7 +2726,7 @@
             </a:ln>
             <a:extLst>
               <a:ext uri="{91240B29-F687-4f45-9708-019B960494DF}">
-                <a14:hiddenLine xmlns:a14="http://schemas.microsoft.com/office/drawing/2010/main" xmlns="" w="9525">
+                <a14:hiddenLine xmlns="" xmlns:a14="http://schemas.microsoft.com/office/drawing/2010/main" w="9525">
                   <a:solidFill>
                     <a:srgbClr val="000000"/>
                   </a:solidFill>
@@ -2788,7 +2788,7 @@
             </a:ln>
             <a:extLst>
               <a:ext uri="{91240B29-F687-4f45-9708-019B960494DF}">
-                <a14:hiddenLine xmlns:a14="http://schemas.microsoft.com/office/drawing/2010/main" xmlns="" w="9525">
+                <a14:hiddenLine xmlns="" xmlns:a14="http://schemas.microsoft.com/office/drawing/2010/main" w="9525">
                   <a:solidFill>
                     <a:srgbClr val="000000"/>
                   </a:solidFill>
@@ -2878,7 +2878,7 @@
             </a:ln>
             <a:extLst>
               <a:ext uri="{91240B29-F687-4f45-9708-019B960494DF}">
-                <a14:hiddenLine xmlns:a14="http://schemas.microsoft.com/office/drawing/2010/main" xmlns="" w="9525">
+                <a14:hiddenLine xmlns="" xmlns:a14="http://schemas.microsoft.com/office/drawing/2010/main" w="9525">
                   <a:solidFill>
                     <a:srgbClr val="000000"/>
                   </a:solidFill>
@@ -2940,7 +2940,7 @@
             </a:ln>
             <a:extLst>
               <a:ext uri="{91240B29-F687-4f45-9708-019B960494DF}">
-                <a14:hiddenLine xmlns:a14="http://schemas.microsoft.com/office/drawing/2010/main" xmlns="" w="9525">
+                <a14:hiddenLine xmlns="" xmlns:a14="http://schemas.microsoft.com/office/drawing/2010/main" w="9525">
                   <a:solidFill>
                     <a:srgbClr val="000000"/>
                   </a:solidFill>
@@ -3030,7 +3030,7 @@
             </a:ln>
             <a:extLst>
               <a:ext uri="{91240B29-F687-4f45-9708-019B960494DF}">
-                <a14:hiddenLine xmlns:a14="http://schemas.microsoft.com/office/drawing/2010/main" xmlns="" w="9525">
+                <a14:hiddenLine xmlns="" xmlns:a14="http://schemas.microsoft.com/office/drawing/2010/main" w="9525">
                   <a:solidFill>
                     <a:srgbClr val="000000"/>
                   </a:solidFill>
@@ -3092,7 +3092,7 @@
             </a:ln>
             <a:extLst>
               <a:ext uri="{91240B29-F687-4f45-9708-019B960494DF}">
-                <a14:hiddenLine xmlns:a14="http://schemas.microsoft.com/office/drawing/2010/main" xmlns="" w="9525">
+                <a14:hiddenLine xmlns="" xmlns:a14="http://schemas.microsoft.com/office/drawing/2010/main" w="9525">
                   <a:solidFill>
                     <a:srgbClr val="000000"/>
                   </a:solidFill>
@@ -3182,7 +3182,7 @@
             </a:ln>
             <a:extLst>
               <a:ext uri="{91240B29-F687-4f45-9708-019B960494DF}">
-                <a14:hiddenLine xmlns:a14="http://schemas.microsoft.com/office/drawing/2010/main" xmlns="" w="9525">
+                <a14:hiddenLine xmlns="" xmlns:a14="http://schemas.microsoft.com/office/drawing/2010/main" w="9525">
                   <a:solidFill>
                     <a:srgbClr val="000000"/>
                   </a:solidFill>
@@ -3216,7 +3216,7 @@
             </a:ln>
             <a:extLst>
               <a:ext uri="{91240B29-F687-4f45-9708-019B960494DF}">
-                <a14:hiddenLine xmlns:a14="http://schemas.microsoft.com/office/drawing/2010/main" xmlns="" w="9525">
+                <a14:hiddenLine xmlns="" xmlns:a14="http://schemas.microsoft.com/office/drawing/2010/main" w="9525">
                   <a:solidFill>
                     <a:srgbClr val="000000"/>
                   </a:solidFill>
@@ -3281,7 +3281,7 @@
             </a:ln>
             <a:extLst>
               <a:ext uri="{91240B29-F687-4f45-9708-019B960494DF}">
-                <a14:hiddenLine xmlns:a14="http://schemas.microsoft.com/office/drawing/2010/main" xmlns="" w="9525">
+                <a14:hiddenLine xmlns="" xmlns:a14="http://schemas.microsoft.com/office/drawing/2010/main" w="9525">
                   <a:solidFill>
                     <a:srgbClr val="000000"/>
                   </a:solidFill>
@@ -3371,7 +3371,7 @@
             </a:ln>
             <a:extLst>
               <a:ext uri="{91240B29-F687-4f45-9708-019B960494DF}">
-                <a14:hiddenLine xmlns:a14="http://schemas.microsoft.com/office/drawing/2010/main" xmlns="" w="9525">
+                <a14:hiddenLine xmlns="" xmlns:a14="http://schemas.microsoft.com/office/drawing/2010/main" w="9525">
                   <a:solidFill>
                     <a:srgbClr val="000000"/>
                   </a:solidFill>
@@ -3433,7 +3433,7 @@
             </a:ln>
             <a:extLst>
               <a:ext uri="{91240B29-F687-4f45-9708-019B960494DF}">
-                <a14:hiddenLine xmlns:a14="http://schemas.microsoft.com/office/drawing/2010/main" xmlns="" w="9525">
+                <a14:hiddenLine xmlns="" xmlns:a14="http://schemas.microsoft.com/office/drawing/2010/main" w="9525">
                   <a:solidFill>
                     <a:srgbClr val="000000"/>
                   </a:solidFill>
@@ -3523,7 +3523,7 @@
             </a:ln>
             <a:extLst>
               <a:ext uri="{91240B29-F687-4f45-9708-019B960494DF}">
-                <a14:hiddenLine xmlns:a14="http://schemas.microsoft.com/office/drawing/2010/main" xmlns="" w="9525">
+                <a14:hiddenLine xmlns="" xmlns:a14="http://schemas.microsoft.com/office/drawing/2010/main" w="9525">
                   <a:solidFill>
                     <a:srgbClr val="000000"/>
                   </a:solidFill>
@@ -3613,7 +3613,7 @@
             </a:ln>
             <a:extLst>
               <a:ext uri="{91240B29-F687-4f45-9708-019B960494DF}">
-                <a14:hiddenLine xmlns:a14="http://schemas.microsoft.com/office/drawing/2010/main" xmlns="" w="9525">
+                <a14:hiddenLine xmlns="" xmlns:a14="http://schemas.microsoft.com/office/drawing/2010/main" w="9525">
                   <a:solidFill>
                     <a:srgbClr val="000000"/>
                   </a:solidFill>
@@ -3678,7 +3678,7 @@
             </a:ln>
             <a:extLst>
               <a:ext uri="{91240B29-F687-4f45-9708-019B960494DF}">
-                <a14:hiddenLine xmlns:a14="http://schemas.microsoft.com/office/drawing/2010/main" xmlns="" w="9525">
+                <a14:hiddenLine xmlns="" xmlns:a14="http://schemas.microsoft.com/office/drawing/2010/main" w="9525">
                   <a:solidFill>
                     <a:srgbClr val="000000"/>
                   </a:solidFill>
@@ -3740,7 +3740,7 @@
             </a:ln>
             <a:extLst>
               <a:ext uri="{91240B29-F687-4f45-9708-019B960494DF}">
-                <a14:hiddenLine xmlns:a14="http://schemas.microsoft.com/office/drawing/2010/main" xmlns="" w="9525">
+                <a14:hiddenLine xmlns="" xmlns:a14="http://schemas.microsoft.com/office/drawing/2010/main" w="9525">
                   <a:solidFill>
                     <a:srgbClr val="000000"/>
                   </a:solidFill>
@@ -3830,7 +3830,7 @@
             </a:ln>
             <a:extLst>
               <a:ext uri="{91240B29-F687-4f45-9708-019B960494DF}">
-                <a14:hiddenLine xmlns:a14="http://schemas.microsoft.com/office/drawing/2010/main" xmlns="" w="9525">
+                <a14:hiddenLine xmlns="" xmlns:a14="http://schemas.microsoft.com/office/drawing/2010/main" w="9525">
                   <a:solidFill>
                     <a:srgbClr val="000000"/>
                   </a:solidFill>
@@ -3920,7 +3920,7 @@
             </a:ln>
             <a:extLst>
               <a:ext uri="{91240B29-F687-4f45-9708-019B960494DF}">
-                <a14:hiddenLine xmlns:a14="http://schemas.microsoft.com/office/drawing/2010/main" xmlns="" w="9525">
+                <a14:hiddenLine xmlns="" xmlns:a14="http://schemas.microsoft.com/office/drawing/2010/main" w="9525">
                   <a:solidFill>
                     <a:srgbClr val="000000"/>
                   </a:solidFill>
@@ -3982,7 +3982,7 @@
             </a:ln>
             <a:extLst>
               <a:ext uri="{91240B29-F687-4f45-9708-019B960494DF}">
-                <a14:hiddenLine xmlns:a14="http://schemas.microsoft.com/office/drawing/2010/main" xmlns="" w="9525">
+                <a14:hiddenLine xmlns="" xmlns:a14="http://schemas.microsoft.com/office/drawing/2010/main" w="9525">
                   <a:solidFill>
                     <a:srgbClr val="000000"/>
                   </a:solidFill>
@@ -4102,7 +4102,7 @@
             </a:ln>
             <a:extLst>
               <a:ext uri="{91240B29-F687-4f45-9708-019B960494DF}">
-                <a14:hiddenLine xmlns:a14="http://schemas.microsoft.com/office/drawing/2010/main" xmlns="" w="9525">
+                <a14:hiddenLine xmlns="" xmlns:a14="http://schemas.microsoft.com/office/drawing/2010/main" w="9525">
                   <a:solidFill>
                     <a:srgbClr val="000000"/>
                   </a:solidFill>
@@ -4170,7 +4170,7 @@
             </a:ln>
             <a:extLst>
               <a:ext uri="{91240B29-F687-4f45-9708-019B960494DF}">
-                <a14:hiddenLine xmlns:a14="http://schemas.microsoft.com/office/drawing/2010/main" xmlns="" w="9525">
+                <a14:hiddenLine xmlns="" xmlns:a14="http://schemas.microsoft.com/office/drawing/2010/main" w="9525">
                   <a:solidFill>
                     <a:srgbClr val="000000"/>
                   </a:solidFill>
@@ -4260,7 +4260,7 @@
             </a:ln>
             <a:extLst>
               <a:ext uri="{91240B29-F687-4f45-9708-019B960494DF}">
-                <a14:hiddenLine xmlns:a14="http://schemas.microsoft.com/office/drawing/2010/main" xmlns="" w="9525">
+                <a14:hiddenLine xmlns="" xmlns:a14="http://schemas.microsoft.com/office/drawing/2010/main" w="9525">
                   <a:solidFill>
                     <a:srgbClr val="000000"/>
                   </a:solidFill>
@@ -4400,7 +4400,7 @@
           <a:p>
             <a:fld id="{4AAD347D-5ACD-4C99-B74B-A9C85AD731AF}" type="datetimeFigureOut">
               <a:rPr lang="en-US" smtClean="0"/>
-              <a:t>10/14/23</a:t>
+              <a:t>10/16/23</a:t>
             </a:fld>
             <a:endParaRPr lang="en-US" dirty="0"/>
           </a:p>
@@ -4667,7 +4667,7 @@
           <a:p>
             <a:fld id="{4509A250-FF31-4206-8172-F9D3106AACB1}" type="datetimeFigureOut">
               <a:rPr lang="en-US" smtClean="0"/>
-              <a:t>10/14/23</a:t>
+              <a:t>10/16/23</a:t>
             </a:fld>
             <a:endParaRPr lang="en-US" dirty="0"/>
           </a:p>
@@ -4863,7 +4863,7 @@
           <a:p>
             <a:fld id="{4AAD347D-5ACD-4C99-B74B-A9C85AD731AF}" type="datetimeFigureOut">
               <a:rPr lang="en-US" smtClean="0"/>
-              <a:t>10/14/23</a:t>
+              <a:t>10/16/23</a:t>
             </a:fld>
             <a:endParaRPr lang="en-US" dirty="0"/>
           </a:p>
@@ -5127,7 +5127,7 @@
           <a:p>
             <a:fld id="{4AAD347D-5ACD-4C99-B74B-A9C85AD731AF}" type="datetimeFigureOut">
               <a:rPr lang="en-US" smtClean="0"/>
-              <a:t>10/14/23</a:t>
+              <a:t>10/16/23</a:t>
             </a:fld>
             <a:endParaRPr lang="en-US" dirty="0"/>
           </a:p>
@@ -5562,7 +5562,7 @@
           <a:p>
             <a:fld id="{4AAD347D-5ACD-4C99-B74B-A9C85AD731AF}" type="datetimeFigureOut">
               <a:rPr lang="en-US" smtClean="0"/>
-              <a:t>10/14/23</a:t>
+              <a:t>10/16/23</a:t>
             </a:fld>
             <a:endParaRPr lang="en-US" dirty="0"/>
           </a:p>
@@ -6109,7 +6109,7 @@
           <a:p>
             <a:fld id="{4AAD347D-5ACD-4C99-B74B-A9C85AD731AF}" type="datetimeFigureOut">
               <a:rPr lang="en-US" smtClean="0"/>
-              <a:t>10/14/23</a:t>
+              <a:t>10/16/23</a:t>
             </a:fld>
             <a:endParaRPr lang="en-US" dirty="0"/>
           </a:p>
@@ -6830,7 +6830,7 @@
           <a:p>
             <a:fld id="{4AAD347D-5ACD-4C99-B74B-A9C85AD731AF}" type="datetimeFigureOut">
               <a:rPr lang="en-US" smtClean="0"/>
-              <a:t>10/14/23</a:t>
+              <a:t>10/16/23</a:t>
             </a:fld>
             <a:endParaRPr lang="en-US" dirty="0"/>
           </a:p>
@@ -7001,7 +7001,7 @@
           <a:p>
             <a:fld id="{4509A250-FF31-4206-8172-F9D3106AACB1}" type="datetimeFigureOut">
               <a:rPr lang="en-US" smtClean="0"/>
-              <a:t>10/14/23</a:t>
+              <a:t>10/16/23</a:t>
             </a:fld>
             <a:endParaRPr lang="en-US" dirty="0"/>
           </a:p>
@@ -7181,7 +7181,7 @@
           <a:p>
             <a:fld id="{4509A250-FF31-4206-8172-F9D3106AACB1}" type="datetimeFigureOut">
               <a:rPr lang="en-US" smtClean="0"/>
-              <a:t>10/14/23</a:t>
+              <a:t>10/16/23</a:t>
             </a:fld>
             <a:endParaRPr lang="en-US" dirty="0"/>
           </a:p>
@@ -7375,7 +7375,7 @@
           <a:p>
             <a:fld id="{4509A250-FF31-4206-8172-F9D3106AACB1}" type="datetimeFigureOut">
               <a:rPr lang="en-US" dirty="0"/>
-              <a:t>10/14/23</a:t>
+              <a:t>10/16/23</a:t>
             </a:fld>
             <a:endParaRPr lang="en-US" dirty="0"/>
           </a:p>
@@ -7545,7 +7545,7 @@
           <a:p>
             <a:fld id="{4509A250-FF31-4206-8172-F9D3106AACB1}" type="datetimeFigureOut">
               <a:rPr lang="en-US" smtClean="0"/>
-              <a:t>10/14/23</a:t>
+              <a:t>10/16/23</a:t>
             </a:fld>
             <a:endParaRPr lang="en-US" dirty="0"/>
           </a:p>
@@ -7795,7 +7795,7 @@
           <a:p>
             <a:fld id="{9796027F-7875-4030-9381-8BD8C4F21935}" type="datetimeFigureOut">
               <a:rPr lang="en-US" smtClean="0"/>
-              <a:t>10/14/23</a:t>
+              <a:t>10/16/23</a:t>
             </a:fld>
             <a:endParaRPr lang="en-US" dirty="0"/>
           </a:p>
@@ -8027,7 +8027,7 @@
           <a:p>
             <a:fld id="{9796027F-7875-4030-9381-8BD8C4F21935}" type="datetimeFigureOut">
               <a:rPr lang="en-US" smtClean="0"/>
-              <a:t>10/14/23</a:t>
+              <a:t>10/16/23</a:t>
             </a:fld>
             <a:endParaRPr lang="en-US" dirty="0"/>
           </a:p>
@@ -8408,7 +8408,7 @@
           <a:p>
             <a:fld id="{9796027F-7875-4030-9381-8BD8C4F21935}" type="datetimeFigureOut">
               <a:rPr lang="en-US" smtClean="0"/>
-              <a:t>10/14/23</a:t>
+              <a:t>10/16/23</a:t>
             </a:fld>
             <a:endParaRPr lang="en-US" dirty="0"/>
           </a:p>
@@ -8526,7 +8526,7 @@
           <a:p>
             <a:fld id="{4509A250-FF31-4206-8172-F9D3106AACB1}" type="datetimeFigureOut">
               <a:rPr lang="en-US" smtClean="0"/>
-              <a:t>10/14/23</a:t>
+              <a:t>10/16/23</a:t>
             </a:fld>
             <a:endParaRPr lang="en-US" dirty="0"/>
           </a:p>
@@ -8621,7 +8621,7 @@
           <a:p>
             <a:fld id="{4509A250-FF31-4206-8172-F9D3106AACB1}" type="datetimeFigureOut">
               <a:rPr lang="en-US" smtClean="0"/>
-              <a:t>10/14/23</a:t>
+              <a:t>10/16/23</a:t>
             </a:fld>
             <a:endParaRPr lang="en-US" dirty="0"/>
           </a:p>
@@ -8870,7 +8870,7 @@
           <a:p>
             <a:fld id="{4509A250-FF31-4206-8172-F9D3106AACB1}" type="datetimeFigureOut">
               <a:rPr lang="en-US" smtClean="0"/>
-              <a:t>10/14/23</a:t>
+              <a:t>10/16/23</a:t>
             </a:fld>
             <a:endParaRPr lang="en-US" dirty="0"/>
           </a:p>
@@ -9150,7 +9150,7 @@
           <a:p>
             <a:fld id="{4509A250-FF31-4206-8172-F9D3106AACB1}" type="datetimeFigureOut">
               <a:rPr lang="en-US" smtClean="0"/>
-              <a:t>10/14/23</a:t>
+              <a:t>10/16/23</a:t>
             </a:fld>
             <a:endParaRPr lang="en-US" dirty="0"/>
           </a:p>
@@ -9273,7 +9273,7 @@
           <a:noFill/>
           <a:extLst>
             <a:ext uri="{909E8E84-426E-40dd-AFC4-6F175D3DCCD1}">
-              <a14:hiddenFill xmlns:a14="http://schemas.microsoft.com/office/drawing/2010/main" xmlns="">
+              <a14:hiddenFill xmlns="" xmlns:a14="http://schemas.microsoft.com/office/drawing/2010/main">
                 <a:solidFill>
                   <a:srgbClr val="FFFFFF"/>
                 </a:solidFill>
@@ -9347,7 +9347,7 @@
               </a:ln>
               <a:extLst>
                 <a:ext uri="{91240B29-F687-4f45-9708-019B960494DF}">
-                  <a14:hiddenLine xmlns:a14="http://schemas.microsoft.com/office/drawing/2010/main" xmlns="" w="9525">
+                  <a14:hiddenLine xmlns="" xmlns:a14="http://schemas.microsoft.com/office/drawing/2010/main" w="9525">
                     <a:solidFill>
                       <a:srgbClr val="000000"/>
                     </a:solidFill>
@@ -9437,7 +9437,7 @@
               </a:ln>
               <a:extLst>
                 <a:ext uri="{91240B29-F687-4f45-9708-019B960494DF}">
-                  <a14:hiddenLine xmlns:a14="http://schemas.microsoft.com/office/drawing/2010/main" xmlns="" w="9525">
+                  <a14:hiddenLine xmlns="" xmlns:a14="http://schemas.microsoft.com/office/drawing/2010/main" w="9525">
                     <a:solidFill>
                       <a:srgbClr val="000000"/>
                     </a:solidFill>
@@ -9527,7 +9527,7 @@
               </a:ln>
               <a:extLst>
                 <a:ext uri="{91240B29-F687-4f45-9708-019B960494DF}">
-                  <a14:hiddenLine xmlns:a14="http://schemas.microsoft.com/office/drawing/2010/main" xmlns="" w="9525">
+                  <a14:hiddenLine xmlns="" xmlns:a14="http://schemas.microsoft.com/office/drawing/2010/main" w="9525">
                     <a:solidFill>
                       <a:srgbClr val="000000"/>
                     </a:solidFill>
@@ -9589,7 +9589,7 @@
               </a:ln>
               <a:extLst>
                 <a:ext uri="{91240B29-F687-4f45-9708-019B960494DF}">
-                  <a14:hiddenLine xmlns:a14="http://schemas.microsoft.com/office/drawing/2010/main" xmlns="" w="9525">
+                  <a14:hiddenLine xmlns="" xmlns:a14="http://schemas.microsoft.com/office/drawing/2010/main" w="9525">
                     <a:solidFill>
                       <a:srgbClr val="000000"/>
                     </a:solidFill>
@@ -9679,7 +9679,7 @@
               </a:ln>
               <a:extLst>
                 <a:ext uri="{91240B29-F687-4f45-9708-019B960494DF}">
-                  <a14:hiddenLine xmlns:a14="http://schemas.microsoft.com/office/drawing/2010/main" xmlns="" w="9525">
+                  <a14:hiddenLine xmlns="" xmlns:a14="http://schemas.microsoft.com/office/drawing/2010/main" w="9525">
                     <a:solidFill>
                       <a:srgbClr val="000000"/>
                     </a:solidFill>
@@ -9741,7 +9741,7 @@
               </a:ln>
               <a:extLst>
                 <a:ext uri="{91240B29-F687-4f45-9708-019B960494DF}">
-                  <a14:hiddenLine xmlns:a14="http://schemas.microsoft.com/office/drawing/2010/main" xmlns="" w="9525">
+                  <a14:hiddenLine xmlns="" xmlns:a14="http://schemas.microsoft.com/office/drawing/2010/main" w="9525">
                     <a:solidFill>
                       <a:srgbClr val="000000"/>
                     </a:solidFill>
@@ -9803,7 +9803,7 @@
               </a:ln>
               <a:extLst>
                 <a:ext uri="{91240B29-F687-4f45-9708-019B960494DF}">
-                  <a14:hiddenLine xmlns:a14="http://schemas.microsoft.com/office/drawing/2010/main" xmlns="" w="9525">
+                  <a14:hiddenLine xmlns="" xmlns:a14="http://schemas.microsoft.com/office/drawing/2010/main" w="9525">
                     <a:solidFill>
                       <a:srgbClr val="000000"/>
                     </a:solidFill>
@@ -9893,7 +9893,7 @@
               </a:ln>
               <a:extLst>
                 <a:ext uri="{91240B29-F687-4f45-9708-019B960494DF}">
-                  <a14:hiddenLine xmlns:a14="http://schemas.microsoft.com/office/drawing/2010/main" xmlns="" w="9525">
+                  <a14:hiddenLine xmlns="" xmlns:a14="http://schemas.microsoft.com/office/drawing/2010/main" w="9525">
                     <a:solidFill>
                       <a:srgbClr val="000000"/>
                     </a:solidFill>
@@ -9983,7 +9983,7 @@
               </a:ln>
               <a:extLst>
                 <a:ext uri="{91240B29-F687-4f45-9708-019B960494DF}">
-                  <a14:hiddenLine xmlns:a14="http://schemas.microsoft.com/office/drawing/2010/main" xmlns="" w="9525">
+                  <a14:hiddenLine xmlns="" xmlns:a14="http://schemas.microsoft.com/office/drawing/2010/main" w="9525">
                     <a:solidFill>
                       <a:srgbClr val="000000"/>
                     </a:solidFill>
@@ -10045,7 +10045,7 @@
               </a:ln>
               <a:extLst>
                 <a:ext uri="{91240B29-F687-4f45-9708-019B960494DF}">
-                  <a14:hiddenLine xmlns:a14="http://schemas.microsoft.com/office/drawing/2010/main" xmlns="" w="9525">
+                  <a14:hiddenLine xmlns="" xmlns:a14="http://schemas.microsoft.com/office/drawing/2010/main" w="9525">
                     <a:solidFill>
                       <a:srgbClr val="000000"/>
                     </a:solidFill>
@@ -10155,7 +10155,7 @@
               </a:ln>
               <a:extLst>
                 <a:ext uri="{91240B29-F687-4f45-9708-019B960494DF}">
-                  <a14:hiddenLine xmlns:a14="http://schemas.microsoft.com/office/drawing/2010/main" xmlns="" w="9525">
+                  <a14:hiddenLine xmlns="" xmlns:a14="http://schemas.microsoft.com/office/drawing/2010/main" w="9525">
                     <a:solidFill>
                       <a:srgbClr val="000000"/>
                     </a:solidFill>
@@ -10239,7 +10239,7 @@
               </a:ln>
               <a:extLst>
                 <a:ext uri="{91240B29-F687-4f45-9708-019B960494DF}">
-                  <a14:hiddenLine xmlns:a14="http://schemas.microsoft.com/office/drawing/2010/main" xmlns="" w="9525">
+                  <a14:hiddenLine xmlns="" xmlns:a14="http://schemas.microsoft.com/office/drawing/2010/main" w="9525">
                     <a:solidFill>
                       <a:srgbClr val="000000"/>
                     </a:solidFill>
@@ -10301,7 +10301,7 @@
               </a:ln>
               <a:extLst>
                 <a:ext uri="{91240B29-F687-4f45-9708-019B960494DF}">
-                  <a14:hiddenLine xmlns:a14="http://schemas.microsoft.com/office/drawing/2010/main" xmlns="" w="9525">
+                  <a14:hiddenLine xmlns="" xmlns:a14="http://schemas.microsoft.com/office/drawing/2010/main" w="9525">
                     <a:solidFill>
                       <a:srgbClr val="000000"/>
                     </a:solidFill>
@@ -10363,7 +10363,7 @@
               </a:ln>
               <a:extLst>
                 <a:ext uri="{91240B29-F687-4f45-9708-019B960494DF}">
-                  <a14:hiddenLine xmlns:a14="http://schemas.microsoft.com/office/drawing/2010/main" xmlns="" w="9525">
+                  <a14:hiddenLine xmlns="" xmlns:a14="http://schemas.microsoft.com/office/drawing/2010/main" w="9525">
                     <a:solidFill>
                       <a:srgbClr val="000000"/>
                     </a:solidFill>
@@ -10453,7 +10453,7 @@
               </a:ln>
               <a:extLst>
                 <a:ext uri="{91240B29-F687-4f45-9708-019B960494DF}">
-                  <a14:hiddenLine xmlns:a14="http://schemas.microsoft.com/office/drawing/2010/main" xmlns="" w="9525">
+                  <a14:hiddenLine xmlns="" xmlns:a14="http://schemas.microsoft.com/office/drawing/2010/main" w="9525">
                     <a:solidFill>
                       <a:srgbClr val="000000"/>
                     </a:solidFill>
@@ -10487,7 +10487,7 @@
               </a:ln>
               <a:extLst>
                 <a:ext uri="{91240B29-F687-4f45-9708-019B960494DF}">
-                  <a14:hiddenLine xmlns:a14="http://schemas.microsoft.com/office/drawing/2010/main" xmlns="" w="9525">
+                  <a14:hiddenLine xmlns="" xmlns:a14="http://schemas.microsoft.com/office/drawing/2010/main" w="9525">
                     <a:solidFill>
                       <a:srgbClr val="000000"/>
                     </a:solidFill>
@@ -10552,7 +10552,7 @@
               </a:ln>
               <a:extLst>
                 <a:ext uri="{91240B29-F687-4f45-9708-019B960494DF}">
-                  <a14:hiddenLine xmlns:a14="http://schemas.microsoft.com/office/drawing/2010/main" xmlns="" w="9525">
+                  <a14:hiddenLine xmlns="" xmlns:a14="http://schemas.microsoft.com/office/drawing/2010/main" w="9525">
                     <a:solidFill>
                       <a:srgbClr val="000000"/>
                     </a:solidFill>
@@ -10642,7 +10642,7 @@
               </a:ln>
               <a:extLst>
                 <a:ext uri="{91240B29-F687-4f45-9708-019B960494DF}">
-                  <a14:hiddenLine xmlns:a14="http://schemas.microsoft.com/office/drawing/2010/main" xmlns="" w="9525">
+                  <a14:hiddenLine xmlns="" xmlns:a14="http://schemas.microsoft.com/office/drawing/2010/main" w="9525">
                     <a:solidFill>
                       <a:srgbClr val="000000"/>
                     </a:solidFill>
@@ -10704,7 +10704,7 @@
               </a:ln>
               <a:extLst>
                 <a:ext uri="{91240B29-F687-4f45-9708-019B960494DF}">
-                  <a14:hiddenLine xmlns:a14="http://schemas.microsoft.com/office/drawing/2010/main" xmlns="" w="9525">
+                  <a14:hiddenLine xmlns="" xmlns:a14="http://schemas.microsoft.com/office/drawing/2010/main" w="9525">
                     <a:solidFill>
                       <a:srgbClr val="000000"/>
                     </a:solidFill>
@@ -10794,7 +10794,7 @@
               </a:ln>
               <a:extLst>
                 <a:ext uri="{91240B29-F687-4f45-9708-019B960494DF}">
-                  <a14:hiddenLine xmlns:a14="http://schemas.microsoft.com/office/drawing/2010/main" xmlns="" w="9525">
+                  <a14:hiddenLine xmlns="" xmlns:a14="http://schemas.microsoft.com/office/drawing/2010/main" w="9525">
                     <a:solidFill>
                       <a:srgbClr val="000000"/>
                     </a:solidFill>
@@ -10859,7 +10859,7 @@
               </a:ln>
               <a:extLst>
                 <a:ext uri="{91240B29-F687-4f45-9708-019B960494DF}">
-                  <a14:hiddenLine xmlns:a14="http://schemas.microsoft.com/office/drawing/2010/main" xmlns="" w="9525">
+                  <a14:hiddenLine xmlns="" xmlns:a14="http://schemas.microsoft.com/office/drawing/2010/main" w="9525">
                     <a:solidFill>
                       <a:srgbClr val="000000"/>
                     </a:solidFill>
@@ -10921,7 +10921,7 @@
               </a:ln>
               <a:extLst>
                 <a:ext uri="{91240B29-F687-4f45-9708-019B960494DF}">
-                  <a14:hiddenLine xmlns:a14="http://schemas.microsoft.com/office/drawing/2010/main" xmlns="" w="9525">
+                  <a14:hiddenLine xmlns="" xmlns:a14="http://schemas.microsoft.com/office/drawing/2010/main" w="9525">
                     <a:solidFill>
                       <a:srgbClr val="000000"/>
                     </a:solidFill>
@@ -11011,7 +11011,7 @@
               </a:ln>
               <a:extLst>
                 <a:ext uri="{91240B29-F687-4f45-9708-019B960494DF}">
-                  <a14:hiddenLine xmlns:a14="http://schemas.microsoft.com/office/drawing/2010/main" xmlns="" w="9525">
+                  <a14:hiddenLine xmlns="" xmlns:a14="http://schemas.microsoft.com/office/drawing/2010/main" w="9525">
                     <a:solidFill>
                       <a:srgbClr val="000000"/>
                     </a:solidFill>
@@ -11101,7 +11101,7 @@
               </a:ln>
               <a:extLst>
                 <a:ext uri="{91240B29-F687-4f45-9708-019B960494DF}">
-                  <a14:hiddenLine xmlns:a14="http://schemas.microsoft.com/office/drawing/2010/main" xmlns="" w="9525">
+                  <a14:hiddenLine xmlns="" xmlns:a14="http://schemas.microsoft.com/office/drawing/2010/main" w="9525">
                     <a:solidFill>
                       <a:srgbClr val="000000"/>
                     </a:solidFill>
@@ -11166,7 +11166,7 @@
               </a:ln>
               <a:extLst>
                 <a:ext uri="{91240B29-F687-4f45-9708-019B960494DF}">
-                  <a14:hiddenLine xmlns:a14="http://schemas.microsoft.com/office/drawing/2010/main" xmlns="" w="9525">
+                  <a14:hiddenLine xmlns="" xmlns:a14="http://schemas.microsoft.com/office/drawing/2010/main" w="9525">
                     <a:solidFill>
                       <a:srgbClr val="000000"/>
                     </a:solidFill>
@@ -11286,7 +11286,7 @@
               </a:ln>
               <a:extLst>
                 <a:ext uri="{91240B29-F687-4f45-9708-019B960494DF}">
-                  <a14:hiddenLine xmlns:a14="http://schemas.microsoft.com/office/drawing/2010/main" xmlns="" w="9525">
+                  <a14:hiddenLine xmlns="" xmlns:a14="http://schemas.microsoft.com/office/drawing/2010/main" w="9525">
                     <a:solidFill>
                       <a:srgbClr val="000000"/>
                     </a:solidFill>
@@ -11367,7 +11367,7 @@
               </a:ln>
               <a:extLst>
                 <a:ext uri="{91240B29-F687-4f45-9708-019B960494DF}">
-                  <a14:hiddenLine xmlns:a14="http://schemas.microsoft.com/office/drawing/2010/main" xmlns="" w="9525">
+                  <a14:hiddenLine xmlns="" xmlns:a14="http://schemas.microsoft.com/office/drawing/2010/main" w="9525">
                     <a:solidFill>
                       <a:srgbClr val="000000"/>
                     </a:solidFill>
@@ -11482,7 +11482,7 @@
               </a:ln>
               <a:extLst>
                 <a:ext uri="{91240B29-F687-4f45-9708-019B960494DF}">
-                  <a14:hiddenLine xmlns:a14="http://schemas.microsoft.com/office/drawing/2010/main" xmlns="" w="9525">
+                  <a14:hiddenLine xmlns="" xmlns:a14="http://schemas.microsoft.com/office/drawing/2010/main" w="9525">
                     <a:solidFill>
                       <a:srgbClr val="000000"/>
                     </a:solidFill>
@@ -11572,7 +11572,7 @@
               </a:ln>
               <a:extLst>
                 <a:ext uri="{91240B29-F687-4f45-9708-019B960494DF}">
-                  <a14:hiddenLine xmlns:a14="http://schemas.microsoft.com/office/drawing/2010/main" xmlns="" w="9525">
+                  <a14:hiddenLine xmlns="" xmlns:a14="http://schemas.microsoft.com/office/drawing/2010/main" w="9525">
                     <a:solidFill>
                       <a:srgbClr val="000000"/>
                     </a:solidFill>
@@ -11637,7 +11637,7 @@
               </a:ln>
               <a:extLst>
                 <a:ext uri="{91240B29-F687-4f45-9708-019B960494DF}">
-                  <a14:hiddenLine xmlns:a14="http://schemas.microsoft.com/office/drawing/2010/main" xmlns="" w="9525">
+                  <a14:hiddenLine xmlns="" xmlns:a14="http://schemas.microsoft.com/office/drawing/2010/main" w="9525">
                     <a:solidFill>
                       <a:srgbClr val="000000"/>
                     </a:solidFill>
@@ -11727,7 +11727,7 @@
               </a:ln>
               <a:extLst>
                 <a:ext uri="{91240B29-F687-4f45-9708-019B960494DF}">
-                  <a14:hiddenLine xmlns:a14="http://schemas.microsoft.com/office/drawing/2010/main" xmlns="" w="9525">
+                  <a14:hiddenLine xmlns="" xmlns:a14="http://schemas.microsoft.com/office/drawing/2010/main" w="9525">
                     <a:solidFill>
                       <a:srgbClr val="000000"/>
                     </a:solidFill>
@@ -11795,7 +11795,7 @@
               </a:ln>
               <a:extLst>
                 <a:ext uri="{91240B29-F687-4f45-9708-019B960494DF}">
-                  <a14:hiddenLine xmlns:a14="http://schemas.microsoft.com/office/drawing/2010/main" xmlns="" w="9525">
+                  <a14:hiddenLine xmlns="" xmlns:a14="http://schemas.microsoft.com/office/drawing/2010/main" w="9525">
                     <a:solidFill>
                       <a:srgbClr val="000000"/>
                     </a:solidFill>
@@ -11885,7 +11885,7 @@
               </a:ln>
               <a:extLst>
                 <a:ext uri="{91240B29-F687-4f45-9708-019B960494DF}">
-                  <a14:hiddenLine xmlns:a14="http://schemas.microsoft.com/office/drawing/2010/main" xmlns="" w="9525">
+                  <a14:hiddenLine xmlns="" xmlns:a14="http://schemas.microsoft.com/office/drawing/2010/main" w="9525">
                     <a:solidFill>
                       <a:srgbClr val="000000"/>
                     </a:solidFill>
@@ -11953,7 +11953,7 @@
               </a:ln>
               <a:extLst>
                 <a:ext uri="{91240B29-F687-4f45-9708-019B960494DF}">
-                  <a14:hiddenLine xmlns:a14="http://schemas.microsoft.com/office/drawing/2010/main" xmlns="" w="9525">
+                  <a14:hiddenLine xmlns="" xmlns:a14="http://schemas.microsoft.com/office/drawing/2010/main" w="9525">
                     <a:solidFill>
                       <a:srgbClr val="000000"/>
                     </a:solidFill>
@@ -12043,7 +12043,7 @@
               </a:ln>
               <a:extLst>
                 <a:ext uri="{91240B29-F687-4f45-9708-019B960494DF}">
-                  <a14:hiddenLine xmlns:a14="http://schemas.microsoft.com/office/drawing/2010/main" xmlns="" w="9525">
+                  <a14:hiddenLine xmlns="" xmlns:a14="http://schemas.microsoft.com/office/drawing/2010/main" w="9525">
                     <a:solidFill>
                       <a:srgbClr val="000000"/>
                     </a:solidFill>
@@ -12077,7 +12077,7 @@
               </a:ln>
               <a:extLst>
                 <a:ext uri="{91240B29-F687-4f45-9708-019B960494DF}">
-                  <a14:hiddenLine xmlns:a14="http://schemas.microsoft.com/office/drawing/2010/main" xmlns="" w="9525">
+                  <a14:hiddenLine xmlns="" xmlns:a14="http://schemas.microsoft.com/office/drawing/2010/main" w="9525">
                     <a:solidFill>
                       <a:srgbClr val="000000"/>
                     </a:solidFill>
@@ -12217,7 +12217,7 @@
           <a:p>
             <a:fld id="{4AAD347D-5ACD-4C99-B74B-A9C85AD731AF}" type="datetimeFigureOut">
               <a:rPr lang="en-US" smtClean="0"/>
-              <a:t>10/14/23</a:t>
+              <a:t>10/16/23</a:t>
             </a:fld>
             <a:endParaRPr lang="en-US" dirty="0"/>
           </a:p>

</xml_diff>